<commit_message>
Changes in D7 to node communication + presentation
</commit_message>
<xml_diff>
--- a/Presentatie_groep_3.pptx
+++ b/Presentatie_groep_3.pptx
@@ -11,23 +11,26 @@
     <p:sldMasterId id="2147483806" r:id="rId7"/>
   </p:sldMasterIdLst>
   <p:notesMasterIdLst>
-    <p:notesMasterId r:id="rId19"/>
+    <p:notesMasterId r:id="rId22"/>
   </p:notesMasterIdLst>
   <p:handoutMasterIdLst>
-    <p:handoutMasterId r:id="rId20"/>
+    <p:handoutMasterId r:id="rId23"/>
   </p:handoutMasterIdLst>
   <p:sldIdLst>
     <p:sldId id="256" r:id="rId8"/>
     <p:sldId id="257" r:id="rId9"/>
     <p:sldId id="258" r:id="rId10"/>
     <p:sldId id="333" r:id="rId11"/>
-    <p:sldId id="335" r:id="rId12"/>
-    <p:sldId id="334" r:id="rId13"/>
-    <p:sldId id="336" r:id="rId14"/>
-    <p:sldId id="338" r:id="rId15"/>
-    <p:sldId id="339" r:id="rId16"/>
-    <p:sldId id="340" r:id="rId17"/>
-    <p:sldId id="324" r:id="rId18"/>
+    <p:sldId id="343" r:id="rId12"/>
+    <p:sldId id="335" r:id="rId13"/>
+    <p:sldId id="334" r:id="rId14"/>
+    <p:sldId id="336" r:id="rId15"/>
+    <p:sldId id="338" r:id="rId16"/>
+    <p:sldId id="339" r:id="rId17"/>
+    <p:sldId id="340" r:id="rId18"/>
+    <p:sldId id="341" r:id="rId19"/>
+    <p:sldId id="342" r:id="rId20"/>
+    <p:sldId id="344" r:id="rId21"/>
   </p:sldIdLst>
   <p:sldSz cx="9144000" cy="5143500" type="screen16x9"/>
   <p:notesSz cx="6858000" cy="9144000"/>
@@ -239,7 +242,7 @@
           <a:p>
             <a:fld id="{8D72D495-AFBC-D049-9D2A-D4CC16EF0503}" type="datetimeFigureOut">
               <a:rPr lang="en-US" smtClean="0"/>
-              <a:t>12/6/2017</a:t>
+              <a:t>12/20/2017</a:t>
             </a:fld>
             <a:endParaRPr lang="en-US"/>
           </a:p>
@@ -14017,7 +14020,7 @@
               <a:rPr lang="en-US" sz="2000" dirty="0">
                 <a:sym typeface="Wingdings" panose="05000000000000000000" pitchFamily="2" charset="2"/>
               </a:rPr>
-              <a:t>Week van 06/12:</a:t>
+              <a:t>Week van 29/11:</a:t>
             </a:r>
           </a:p>
           <a:p>
@@ -14026,16 +14029,10 @@
               <a:buChar char="•"/>
             </a:pPr>
             <a:r>
-              <a:rPr lang="en-US" sz="2000" dirty="0" err="1">
-                <a:sym typeface="Wingdings" panose="05000000000000000000" pitchFamily="2" charset="2"/>
-              </a:rPr>
-              <a:t>eCompass</a:t>
-            </a:r>
-            <a:r>
               <a:rPr lang="en-US" sz="2000" dirty="0">
                 <a:sym typeface="Wingdings" panose="05000000000000000000" pitchFamily="2" charset="2"/>
               </a:rPr>
-              <a:t> (Jonas &amp; Liam)</a:t>
+              <a:t>GPS (Jonas)</a:t>
             </a:r>
           </a:p>
           <a:p>
@@ -14047,7 +14044,19 @@
               <a:rPr lang="en-US" sz="2000" dirty="0">
                 <a:sym typeface="Wingdings" panose="05000000000000000000" pitchFamily="2" charset="2"/>
               </a:rPr>
-              <a:t>Dash7 (Thomas)</a:t>
+              <a:t>Backend </a:t>
+            </a:r>
+            <a:r>
+              <a:rPr lang="en-US" sz="2000" dirty="0" err="1">
+                <a:sym typeface="Wingdings" panose="05000000000000000000" pitchFamily="2" charset="2"/>
+              </a:rPr>
+              <a:t>klaar</a:t>
+            </a:r>
+            <a:r>
+              <a:rPr lang="en-US" sz="2000" dirty="0">
+                <a:sym typeface="Wingdings" panose="05000000000000000000" pitchFamily="2" charset="2"/>
+              </a:rPr>
+              <a:t> (Thomas &amp; Liam)</a:t>
             </a:r>
           </a:p>
           <a:p>
@@ -14163,7 +14172,7 @@
     </p:spTree>
     <p:extLst>
       <p:ext uri="{BB962C8B-B14F-4D97-AF65-F5344CB8AC3E}">
-        <p14:creationId xmlns:p14="http://schemas.microsoft.com/office/powerpoint/2010/main" val="373716614"/>
+        <p14:creationId xmlns:p14="http://schemas.microsoft.com/office/powerpoint/2010/main" val="3343426595"/>
       </p:ext>
     </p:extLst>
   </p:cSld>
@@ -14202,12 +14211,923 @@
           <a:chExt cx="0" cy="0"/>
         </a:xfrm>
       </p:grpSpPr>
+      <p:sp>
+        <p:nvSpPr>
+          <p:cNvPr id="2" name="Title 1"/>
+          <p:cNvSpPr>
+            <a:spLocks noGrp="1"/>
+          </p:cNvSpPr>
+          <p:nvPr>
+            <p:ph type="title"/>
+          </p:nvPr>
+        </p:nvSpPr>
+        <p:spPr/>
+        <p:txBody>
+          <a:bodyPr/>
+          <a:lstStyle/>
+          <a:p>
+            <a:r>
+              <a:rPr lang="en-US" dirty="0"/>
+              <a:t>Project: </a:t>
+            </a:r>
+            <a:r>
+              <a:rPr lang="en-US" dirty="0" err="1"/>
+              <a:t>Uitgevoerde</a:t>
+            </a:r>
+            <a:r>
+              <a:rPr lang="en-US" dirty="0"/>
+              <a:t> planning</a:t>
+            </a:r>
+          </a:p>
+        </p:txBody>
+      </p:sp>
+      <p:sp>
+        <p:nvSpPr>
+          <p:cNvPr id="3" name="Content Placeholder 2"/>
+          <p:cNvSpPr>
+            <a:spLocks noGrp="1"/>
+          </p:cNvSpPr>
+          <p:nvPr>
+            <p:ph idx="1"/>
+          </p:nvPr>
+        </p:nvSpPr>
+        <p:spPr/>
+        <p:txBody>
+          <a:bodyPr anchor="t">
+            <a:normAutofit/>
+          </a:bodyPr>
+          <a:lstStyle/>
+          <a:p>
+            <a:pPr marL="102870" indent="0">
+              <a:buNone/>
+            </a:pPr>
+            <a:r>
+              <a:rPr lang="en-US" sz="2000" dirty="0">
+                <a:sym typeface="Wingdings" panose="05000000000000000000" pitchFamily="2" charset="2"/>
+              </a:rPr>
+              <a:t>Week van 06/12:</a:t>
+            </a:r>
+          </a:p>
+          <a:p>
+            <a:pPr marL="445770" indent="-342900">
+              <a:buFont typeface="Arial" panose="020B0604020202020204" pitchFamily="34" charset="0"/>
+              <a:buChar char="•"/>
+            </a:pPr>
+            <a:r>
+              <a:rPr lang="en-US" sz="2000" dirty="0" err="1">
+                <a:sym typeface="Wingdings" panose="05000000000000000000" pitchFamily="2" charset="2"/>
+              </a:rPr>
+              <a:t>eCompass</a:t>
+            </a:r>
+            <a:r>
+              <a:rPr lang="en-US" sz="2000" dirty="0">
+                <a:sym typeface="Wingdings" panose="05000000000000000000" pitchFamily="2" charset="2"/>
+              </a:rPr>
+              <a:t> (Jonas &amp; Liam)</a:t>
+            </a:r>
+          </a:p>
+          <a:p>
+            <a:pPr marL="445770" indent="-342900">
+              <a:buFont typeface="Arial" panose="020B0604020202020204" pitchFamily="34" charset="0"/>
+              <a:buChar char="•"/>
+            </a:pPr>
+            <a:r>
+              <a:rPr lang="en-US" sz="2000" dirty="0">
+                <a:sym typeface="Wingdings" panose="05000000000000000000" pitchFamily="2" charset="2"/>
+              </a:rPr>
+              <a:t>Dash7 (Thomas)</a:t>
+            </a:r>
+          </a:p>
+          <a:p>
+            <a:pPr marL="445770" indent="-342900">
+              <a:buFont typeface="Arial" panose="020B0604020202020204" pitchFamily="34" charset="0"/>
+              <a:buChar char="•"/>
+            </a:pPr>
+            <a:r>
+              <a:rPr lang="en-US" sz="2000" dirty="0" err="1">
+                <a:sym typeface="Wingdings" panose="05000000000000000000" pitchFamily="2" charset="2"/>
+              </a:rPr>
+              <a:t>LoRaWAN</a:t>
+            </a:r>
+            <a:r>
+              <a:rPr lang="en-US" sz="2000" dirty="0">
+                <a:sym typeface="Wingdings" panose="05000000000000000000" pitchFamily="2" charset="2"/>
+              </a:rPr>
+              <a:t> (</a:t>
+            </a:r>
+            <a:r>
+              <a:rPr lang="en-US" sz="2000" dirty="0" err="1">
+                <a:sym typeface="Wingdings" panose="05000000000000000000" pitchFamily="2" charset="2"/>
+              </a:rPr>
+              <a:t>Lennert</a:t>
+            </a:r>
+            <a:r>
+              <a:rPr lang="en-US" sz="2000" dirty="0">
+                <a:sym typeface="Wingdings" panose="05000000000000000000" pitchFamily="2" charset="2"/>
+              </a:rPr>
+              <a:t>)</a:t>
+            </a:r>
+          </a:p>
+          <a:p>
+            <a:pPr marL="445770" indent="-342900">
+              <a:buFont typeface="Arial" panose="020B0604020202020204" pitchFamily="34" charset="0"/>
+              <a:buChar char="•"/>
+            </a:pPr>
+            <a:endParaRPr lang="en-US" sz="2000" dirty="0">
+              <a:sym typeface="Wingdings" panose="05000000000000000000" pitchFamily="2" charset="2"/>
+            </a:endParaRPr>
+          </a:p>
+          <a:p>
+            <a:pPr marL="445770" indent="-342900">
+              <a:buFont typeface="+mj-lt"/>
+              <a:buAutoNum type="arabicPeriod"/>
+            </a:pPr>
+            <a:endParaRPr lang="en-US" sz="2000" dirty="0">
+              <a:sym typeface="Wingdings" panose="05000000000000000000" pitchFamily="2" charset="2"/>
+            </a:endParaRPr>
+          </a:p>
+          <a:p>
+            <a:pPr marL="445770" indent="-342900">
+              <a:buFont typeface="+mj-lt"/>
+              <a:buAutoNum type="arabicPeriod"/>
+            </a:pPr>
+            <a:endParaRPr lang="en-US" sz="2000" dirty="0">
+              <a:sym typeface="Wingdings" panose="05000000000000000000" pitchFamily="2" charset="2"/>
+            </a:endParaRPr>
+          </a:p>
+          <a:p>
+            <a:pPr marL="445770" indent="-342900">
+              <a:buFont typeface="+mj-lt"/>
+              <a:buAutoNum type="arabicPeriod"/>
+            </a:pPr>
+            <a:endParaRPr lang="en-US" sz="2000" dirty="0">
+              <a:sym typeface="Wingdings" panose="05000000000000000000" pitchFamily="2" charset="2"/>
+            </a:endParaRPr>
+          </a:p>
+          <a:p>
+            <a:pPr marL="445770" indent="-342900">
+              <a:buFont typeface="+mj-lt"/>
+              <a:buAutoNum type="arabicPeriod"/>
+            </a:pPr>
+            <a:endParaRPr lang="en-US" sz="2000" dirty="0">
+              <a:sym typeface="Wingdings" panose="05000000000000000000" pitchFamily="2" charset="2"/>
+            </a:endParaRPr>
+          </a:p>
+          <a:p>
+            <a:pPr marL="411480" lvl="1" indent="0">
+              <a:buNone/>
+            </a:pPr>
+            <a:endParaRPr lang="en-US" sz="1820" dirty="0"/>
+          </a:p>
+          <a:p>
+            <a:pPr lvl="1"/>
+            <a:endParaRPr lang="en-US" sz="1820" dirty="0"/>
+          </a:p>
+        </p:txBody>
+      </p:sp>
+      <p:sp>
+        <p:nvSpPr>
+          <p:cNvPr id="5" name="Slide Number Placeholder 4"/>
+          <p:cNvSpPr>
+            <a:spLocks noGrp="1"/>
+          </p:cNvSpPr>
+          <p:nvPr>
+            <p:ph type="sldNum" sz="quarter" idx="12"/>
+          </p:nvPr>
+        </p:nvSpPr>
+        <p:spPr/>
+        <p:txBody>
+          <a:bodyPr/>
+          <a:lstStyle/>
+          <a:p>
+            <a:fld id="{8836216C-5BC3-7C44-80F8-E30864FFC228}" type="slidenum">
+              <a:rPr lang="en-US" smtClean="0"/>
+              <a:t>11</a:t>
+            </a:fld>
+            <a:endParaRPr lang="en-US" dirty="0"/>
+          </a:p>
+        </p:txBody>
+      </p:sp>
+    </p:spTree>
+    <p:extLst>
+      <p:ext uri="{BB962C8B-B14F-4D97-AF65-F5344CB8AC3E}">
+        <p14:creationId xmlns:p14="http://schemas.microsoft.com/office/powerpoint/2010/main" val="373716614"/>
+      </p:ext>
+    </p:extLst>
+  </p:cSld>
+  <p:clrMapOvr>
+    <a:masterClrMapping/>
+  </p:clrMapOvr>
+  <mc:AlternateContent xmlns:mc="http://schemas.openxmlformats.org/markup-compatibility/2006" xmlns:p14="http://schemas.microsoft.com/office/powerpoint/2010/main">
+    <mc:Choice Requires="p14">
+      <p:transition spd="med" p14:dur="700">
+        <p:fade/>
+      </p:transition>
+    </mc:Choice>
+    <mc:Fallback xmlns="">
+      <p:transition spd="med">
+        <p:fade/>
+      </p:transition>
+    </mc:Fallback>
+  </mc:AlternateContent>
+</p:sld>
+</file>
+
+<file path=ppt/slides/slide12.xml><?xml version="1.0" encoding="utf-8"?>
+<p:sld xmlns:a="http://schemas.openxmlformats.org/drawingml/2006/main" xmlns:r="http://schemas.openxmlformats.org/officeDocument/2006/relationships" xmlns:p="http://schemas.openxmlformats.org/presentationml/2006/main">
+  <p:cSld>
+    <p:spTree>
+      <p:nvGrpSpPr>
+        <p:cNvPr id="1" name=""/>
+        <p:cNvGrpSpPr/>
+        <p:nvPr/>
+      </p:nvGrpSpPr>
+      <p:grpSpPr>
+        <a:xfrm>
+          <a:off x="0" y="0"/>
+          <a:ext cx="0" cy="0"/>
+          <a:chOff x="0" y="0"/>
+          <a:chExt cx="0" cy="0"/>
+        </a:xfrm>
+      </p:grpSpPr>
+      <p:sp>
+        <p:nvSpPr>
+          <p:cNvPr id="2" name="Title 1"/>
+          <p:cNvSpPr>
+            <a:spLocks noGrp="1"/>
+          </p:cNvSpPr>
+          <p:nvPr>
+            <p:ph type="title"/>
+          </p:nvPr>
+        </p:nvSpPr>
+        <p:spPr/>
+        <p:txBody>
+          <a:bodyPr/>
+          <a:lstStyle/>
+          <a:p>
+            <a:r>
+              <a:rPr lang="en-US" dirty="0"/>
+              <a:t>Project: </a:t>
+            </a:r>
+            <a:r>
+              <a:rPr lang="en-US" dirty="0" err="1"/>
+              <a:t>Uitgevoerde</a:t>
+            </a:r>
+            <a:r>
+              <a:rPr lang="en-US" dirty="0"/>
+              <a:t> planning</a:t>
+            </a:r>
+          </a:p>
+        </p:txBody>
+      </p:sp>
+      <p:sp>
+        <p:nvSpPr>
+          <p:cNvPr id="3" name="Content Placeholder 2"/>
+          <p:cNvSpPr>
+            <a:spLocks noGrp="1"/>
+          </p:cNvSpPr>
+          <p:nvPr>
+            <p:ph idx="1"/>
+          </p:nvPr>
+        </p:nvSpPr>
+        <p:spPr/>
+        <p:txBody>
+          <a:bodyPr anchor="t">
+            <a:normAutofit/>
+          </a:bodyPr>
+          <a:lstStyle/>
+          <a:p>
+            <a:pPr marL="102870" indent="0">
+              <a:buNone/>
+            </a:pPr>
+            <a:r>
+              <a:rPr lang="en-US" sz="2000" dirty="0">
+                <a:sym typeface="Wingdings" panose="05000000000000000000" pitchFamily="2" charset="2"/>
+              </a:rPr>
+              <a:t>Week van 13/12 </a:t>
+            </a:r>
+            <a:r>
+              <a:rPr lang="en-US" sz="2000" dirty="0" err="1">
+                <a:sym typeface="Wingdings" panose="05000000000000000000" pitchFamily="2" charset="2"/>
+              </a:rPr>
+              <a:t>en</a:t>
+            </a:r>
+            <a:r>
+              <a:rPr lang="en-US" sz="2000" dirty="0">
+                <a:sym typeface="Wingdings" panose="05000000000000000000" pitchFamily="2" charset="2"/>
+              </a:rPr>
+              <a:t> 20/12:</a:t>
+            </a:r>
+          </a:p>
+          <a:p>
+            <a:pPr marL="445770" indent="-342900">
+              <a:buFont typeface="Arial" panose="020B0604020202020204" pitchFamily="34" charset="0"/>
+              <a:buChar char="•"/>
+            </a:pPr>
+            <a:r>
+              <a:rPr lang="en-US" sz="2000" dirty="0" err="1">
+                <a:sym typeface="Wingdings" panose="05000000000000000000" pitchFamily="2" charset="2"/>
+              </a:rPr>
+              <a:t>Variabele</a:t>
+            </a:r>
+            <a:r>
+              <a:rPr lang="en-US" sz="2000" dirty="0">
+                <a:sym typeface="Wingdings" panose="05000000000000000000" pitchFamily="2" charset="2"/>
+              </a:rPr>
+              <a:t> </a:t>
+            </a:r>
+            <a:r>
+              <a:rPr lang="en-US" sz="2000" dirty="0" err="1">
+                <a:sym typeface="Wingdings" panose="05000000000000000000" pitchFamily="2" charset="2"/>
+              </a:rPr>
+              <a:t>sensordata</a:t>
+            </a:r>
+            <a:r>
+              <a:rPr lang="en-US" sz="2000" dirty="0">
+                <a:sym typeface="Wingdings" panose="05000000000000000000" pitchFamily="2" charset="2"/>
+              </a:rPr>
+              <a:t> </a:t>
+            </a:r>
+            <a:r>
+              <a:rPr lang="en-US" sz="2000" dirty="0" err="1">
+                <a:sym typeface="Wingdings" panose="05000000000000000000" pitchFamily="2" charset="2"/>
+              </a:rPr>
+              <a:t>sturen</a:t>
+            </a:r>
+            <a:r>
+              <a:rPr lang="en-US" sz="2000" dirty="0">
+                <a:sym typeface="Wingdings" panose="05000000000000000000" pitchFamily="2" charset="2"/>
+              </a:rPr>
+              <a:t> via DASH7 (Liam &amp; Thomas)</a:t>
+            </a:r>
+          </a:p>
+          <a:p>
+            <a:pPr marL="445770" indent="-342900">
+              <a:buFont typeface="Arial" panose="020B0604020202020204" pitchFamily="34" charset="0"/>
+              <a:buChar char="•"/>
+            </a:pPr>
+            <a:r>
+              <a:rPr lang="en-US" sz="2000" dirty="0" err="1">
+                <a:sym typeface="Wingdings" panose="05000000000000000000" pitchFamily="2" charset="2"/>
+              </a:rPr>
+              <a:t>LoRa</a:t>
+            </a:r>
+            <a:r>
+              <a:rPr lang="en-US" sz="2000" dirty="0">
+                <a:sym typeface="Wingdings" panose="05000000000000000000" pitchFamily="2" charset="2"/>
+              </a:rPr>
+              <a:t>: </a:t>
+            </a:r>
+            <a:r>
+              <a:rPr lang="en-US" sz="2000" dirty="0" err="1">
+                <a:sym typeface="Wingdings" panose="05000000000000000000" pitchFamily="2" charset="2"/>
+              </a:rPr>
+              <a:t>communicatie</a:t>
+            </a:r>
+            <a:r>
+              <a:rPr lang="en-US" sz="2000" dirty="0">
+                <a:sym typeface="Wingdings" panose="05000000000000000000" pitchFamily="2" charset="2"/>
+              </a:rPr>
+              <a:t> UART (</a:t>
+            </a:r>
+            <a:r>
+              <a:rPr lang="en-US" sz="2000" dirty="0" err="1">
+                <a:sym typeface="Wingdings" panose="05000000000000000000" pitchFamily="2" charset="2"/>
+              </a:rPr>
+              <a:t>Lennert</a:t>
+            </a:r>
+            <a:r>
+              <a:rPr lang="en-US" sz="2000" dirty="0">
+                <a:sym typeface="Wingdings" panose="05000000000000000000" pitchFamily="2" charset="2"/>
+              </a:rPr>
+              <a:t>)</a:t>
+            </a:r>
+          </a:p>
+          <a:p>
+            <a:pPr marL="445770" indent="-342900">
+              <a:buFont typeface="Arial" panose="020B0604020202020204" pitchFamily="34" charset="0"/>
+              <a:buChar char="•"/>
+            </a:pPr>
+            <a:r>
+              <a:rPr lang="en-US" sz="2000" dirty="0">
+                <a:sym typeface="Wingdings" panose="05000000000000000000" pitchFamily="2" charset="2"/>
+              </a:rPr>
+              <a:t>GPS-</a:t>
+            </a:r>
+            <a:r>
+              <a:rPr lang="en-US" sz="2000" dirty="0" err="1">
+                <a:sym typeface="Wingdings" panose="05000000000000000000" pitchFamily="2" charset="2"/>
+              </a:rPr>
+              <a:t>coördinaten</a:t>
+            </a:r>
+            <a:r>
+              <a:rPr lang="en-US" sz="2000" dirty="0">
+                <a:sym typeface="Wingdings" panose="05000000000000000000" pitchFamily="2" charset="2"/>
+              </a:rPr>
+              <a:t> </a:t>
+            </a:r>
+            <a:r>
+              <a:rPr lang="en-US" sz="2000" dirty="0" err="1">
+                <a:sym typeface="Wingdings" panose="05000000000000000000" pitchFamily="2" charset="2"/>
+              </a:rPr>
+              <a:t>doorsturen</a:t>
+            </a:r>
+            <a:r>
+              <a:rPr lang="en-US" sz="2000" dirty="0">
+                <a:sym typeface="Wingdings" panose="05000000000000000000" pitchFamily="2" charset="2"/>
+              </a:rPr>
+              <a:t> (Jonas)</a:t>
+            </a:r>
+          </a:p>
+          <a:p>
+            <a:pPr marL="445770" indent="-342900">
+              <a:buFont typeface="Arial" panose="020B0604020202020204" pitchFamily="34" charset="0"/>
+              <a:buChar char="•"/>
+            </a:pPr>
+            <a:endParaRPr lang="en-US" sz="2000" dirty="0">
+              <a:sym typeface="Wingdings" panose="05000000000000000000" pitchFamily="2" charset="2"/>
+            </a:endParaRPr>
+          </a:p>
+          <a:p>
+            <a:pPr marL="445770" indent="-342900">
+              <a:buFont typeface="+mj-lt"/>
+              <a:buAutoNum type="arabicPeriod"/>
+            </a:pPr>
+            <a:endParaRPr lang="en-US" sz="2000" dirty="0">
+              <a:sym typeface="Wingdings" panose="05000000000000000000" pitchFamily="2" charset="2"/>
+            </a:endParaRPr>
+          </a:p>
+          <a:p>
+            <a:pPr marL="445770" indent="-342900">
+              <a:buFont typeface="+mj-lt"/>
+              <a:buAutoNum type="arabicPeriod"/>
+            </a:pPr>
+            <a:endParaRPr lang="en-US" sz="2000" dirty="0">
+              <a:sym typeface="Wingdings" panose="05000000000000000000" pitchFamily="2" charset="2"/>
+            </a:endParaRPr>
+          </a:p>
+          <a:p>
+            <a:pPr marL="445770" indent="-342900">
+              <a:buFont typeface="+mj-lt"/>
+              <a:buAutoNum type="arabicPeriod"/>
+            </a:pPr>
+            <a:endParaRPr lang="en-US" sz="2000" dirty="0">
+              <a:sym typeface="Wingdings" panose="05000000000000000000" pitchFamily="2" charset="2"/>
+            </a:endParaRPr>
+          </a:p>
+          <a:p>
+            <a:pPr marL="445770" indent="-342900">
+              <a:buFont typeface="+mj-lt"/>
+              <a:buAutoNum type="arabicPeriod"/>
+            </a:pPr>
+            <a:endParaRPr lang="en-US" sz="2000" dirty="0">
+              <a:sym typeface="Wingdings" panose="05000000000000000000" pitchFamily="2" charset="2"/>
+            </a:endParaRPr>
+          </a:p>
+          <a:p>
+            <a:pPr marL="411480" lvl="1" indent="0">
+              <a:buNone/>
+            </a:pPr>
+            <a:endParaRPr lang="en-US" sz="1820" dirty="0"/>
+          </a:p>
+          <a:p>
+            <a:pPr lvl="1"/>
+            <a:endParaRPr lang="en-US" sz="1820" dirty="0"/>
+          </a:p>
+        </p:txBody>
+      </p:sp>
+      <p:sp>
+        <p:nvSpPr>
+          <p:cNvPr id="5" name="Slide Number Placeholder 4"/>
+          <p:cNvSpPr>
+            <a:spLocks noGrp="1"/>
+          </p:cNvSpPr>
+          <p:nvPr>
+            <p:ph type="sldNum" sz="quarter" idx="12"/>
+          </p:nvPr>
+        </p:nvSpPr>
+        <p:spPr/>
+        <p:txBody>
+          <a:bodyPr/>
+          <a:lstStyle/>
+          <a:p>
+            <a:fld id="{8836216C-5BC3-7C44-80F8-E30864FFC228}" type="slidenum">
+              <a:rPr lang="en-US" smtClean="0"/>
+              <a:t>12</a:t>
+            </a:fld>
+            <a:endParaRPr lang="en-US" dirty="0"/>
+          </a:p>
+        </p:txBody>
+      </p:sp>
+    </p:spTree>
+    <p:extLst>
+      <p:ext uri="{BB962C8B-B14F-4D97-AF65-F5344CB8AC3E}">
+        <p14:creationId xmlns:p14="http://schemas.microsoft.com/office/powerpoint/2010/main" val="3470413742"/>
+      </p:ext>
+    </p:extLst>
+  </p:cSld>
+  <p:clrMapOvr>
+    <a:masterClrMapping/>
+  </p:clrMapOvr>
+  <mc:AlternateContent xmlns:mc="http://schemas.openxmlformats.org/markup-compatibility/2006" xmlns:p14="http://schemas.microsoft.com/office/powerpoint/2010/main">
+    <mc:Choice Requires="p14">
+      <p:transition spd="med" p14:dur="700">
+        <p:fade/>
+      </p:transition>
+    </mc:Choice>
+    <mc:Fallback xmlns="">
+      <p:transition spd="med">
+        <p:fade/>
+      </p:transition>
+    </mc:Fallback>
+  </mc:AlternateContent>
+</p:sld>
+</file>
+
+<file path=ppt/slides/slide13.xml><?xml version="1.0" encoding="utf-8"?>
+<p:sld xmlns:a="http://schemas.openxmlformats.org/drawingml/2006/main" xmlns:r="http://schemas.openxmlformats.org/officeDocument/2006/relationships" xmlns:p="http://schemas.openxmlformats.org/presentationml/2006/main">
+  <p:cSld>
+    <p:spTree>
+      <p:nvGrpSpPr>
+        <p:cNvPr id="1" name=""/>
+        <p:cNvGrpSpPr/>
+        <p:nvPr/>
+      </p:nvGrpSpPr>
+      <p:grpSpPr>
+        <a:xfrm>
+          <a:off x="0" y="0"/>
+          <a:ext cx="0" cy="0"/>
+          <a:chOff x="0" y="0"/>
+          <a:chExt cx="0" cy="0"/>
+        </a:xfrm>
+      </p:grpSpPr>
+      <p:sp>
+        <p:nvSpPr>
+          <p:cNvPr id="2" name="Title 1"/>
+          <p:cNvSpPr>
+            <a:spLocks noGrp="1"/>
+          </p:cNvSpPr>
+          <p:nvPr>
+            <p:ph type="title"/>
+          </p:nvPr>
+        </p:nvSpPr>
+        <p:spPr/>
+        <p:txBody>
+          <a:bodyPr/>
+          <a:lstStyle/>
+          <a:p>
+            <a:r>
+              <a:rPr lang="en-US" dirty="0" err="1"/>
+              <a:t>Niet</a:t>
+            </a:r>
+            <a:r>
+              <a:rPr lang="en-US" dirty="0"/>
+              <a:t> </a:t>
+            </a:r>
+            <a:r>
+              <a:rPr lang="en-US" dirty="0" err="1"/>
+              <a:t>gerealiseerd</a:t>
+            </a:r>
+            <a:endParaRPr lang="en-US" dirty="0"/>
+          </a:p>
+        </p:txBody>
+      </p:sp>
+      <p:sp>
+        <p:nvSpPr>
+          <p:cNvPr id="3" name="Content Placeholder 2"/>
+          <p:cNvSpPr>
+            <a:spLocks noGrp="1"/>
+          </p:cNvSpPr>
+          <p:nvPr>
+            <p:ph idx="1"/>
+          </p:nvPr>
+        </p:nvSpPr>
+        <p:spPr/>
+        <p:txBody>
+          <a:bodyPr anchor="t">
+            <a:normAutofit/>
+          </a:bodyPr>
+          <a:lstStyle/>
+          <a:p>
+            <a:pPr marL="102870" indent="0">
+              <a:buNone/>
+            </a:pPr>
+            <a:r>
+              <a:rPr lang="en-US" sz="2000" dirty="0">
+                <a:sym typeface="Wingdings" panose="05000000000000000000" pitchFamily="2" charset="2"/>
+              </a:rPr>
+              <a:t>Week van 13/12 </a:t>
+            </a:r>
+            <a:r>
+              <a:rPr lang="en-US" sz="2000" dirty="0" err="1">
+                <a:sym typeface="Wingdings" panose="05000000000000000000" pitchFamily="2" charset="2"/>
+              </a:rPr>
+              <a:t>en</a:t>
+            </a:r>
+            <a:r>
+              <a:rPr lang="en-US" sz="2000" dirty="0">
+                <a:sym typeface="Wingdings" panose="05000000000000000000" pitchFamily="2" charset="2"/>
+              </a:rPr>
+              <a:t> 20/12:</a:t>
+            </a:r>
+          </a:p>
+          <a:p>
+            <a:pPr marL="445770" indent="-342900">
+              <a:buFont typeface="Arial" panose="020B0604020202020204" pitchFamily="34" charset="0"/>
+              <a:buChar char="•"/>
+            </a:pPr>
+            <a:r>
+              <a:rPr lang="en-US" sz="2000" dirty="0" err="1">
+                <a:sym typeface="Wingdings" panose="05000000000000000000" pitchFamily="2" charset="2"/>
+              </a:rPr>
+              <a:t>Variabele</a:t>
+            </a:r>
+            <a:r>
+              <a:rPr lang="en-US" sz="2000" dirty="0">
+                <a:sym typeface="Wingdings" panose="05000000000000000000" pitchFamily="2" charset="2"/>
+              </a:rPr>
+              <a:t> </a:t>
+            </a:r>
+            <a:r>
+              <a:rPr lang="en-US" sz="2000" dirty="0" err="1">
+                <a:sym typeface="Wingdings" panose="05000000000000000000" pitchFamily="2" charset="2"/>
+              </a:rPr>
+              <a:t>sensordata</a:t>
+            </a:r>
+            <a:r>
+              <a:rPr lang="en-US" sz="2000" dirty="0">
+                <a:sym typeface="Wingdings" panose="05000000000000000000" pitchFamily="2" charset="2"/>
+              </a:rPr>
+              <a:t> </a:t>
+            </a:r>
+            <a:r>
+              <a:rPr lang="en-US" sz="2000" dirty="0" err="1">
+                <a:sym typeface="Wingdings" panose="05000000000000000000" pitchFamily="2" charset="2"/>
+              </a:rPr>
+              <a:t>sturen</a:t>
+            </a:r>
+            <a:r>
+              <a:rPr lang="en-US" sz="2000" dirty="0">
+                <a:sym typeface="Wingdings" panose="05000000000000000000" pitchFamily="2" charset="2"/>
+              </a:rPr>
+              <a:t> via DASH7 (Liam &amp; Thomas)</a:t>
+            </a:r>
+          </a:p>
+          <a:p>
+            <a:pPr marL="445770" indent="-342900">
+              <a:buFont typeface="Arial" panose="020B0604020202020204" pitchFamily="34" charset="0"/>
+              <a:buChar char="•"/>
+            </a:pPr>
+            <a:r>
+              <a:rPr lang="en-US" sz="2000" dirty="0" err="1">
+                <a:sym typeface="Wingdings" panose="05000000000000000000" pitchFamily="2" charset="2"/>
+              </a:rPr>
+              <a:t>LoRa</a:t>
+            </a:r>
+            <a:r>
+              <a:rPr lang="en-US" sz="2000" dirty="0">
+                <a:sym typeface="Wingdings" panose="05000000000000000000" pitchFamily="2" charset="2"/>
+              </a:rPr>
+              <a:t>: </a:t>
+            </a:r>
+            <a:r>
+              <a:rPr lang="en-US" sz="2000" dirty="0" err="1">
+                <a:sym typeface="Wingdings" panose="05000000000000000000" pitchFamily="2" charset="2"/>
+              </a:rPr>
+              <a:t>communicatie</a:t>
+            </a:r>
+            <a:r>
+              <a:rPr lang="en-US" sz="2000" dirty="0">
+                <a:sym typeface="Wingdings" panose="05000000000000000000" pitchFamily="2" charset="2"/>
+              </a:rPr>
+              <a:t> UART (</a:t>
+            </a:r>
+            <a:r>
+              <a:rPr lang="en-US" sz="2000" dirty="0" err="1">
+                <a:sym typeface="Wingdings" panose="05000000000000000000" pitchFamily="2" charset="2"/>
+              </a:rPr>
+              <a:t>Lennert</a:t>
+            </a:r>
+            <a:r>
+              <a:rPr lang="en-US" sz="2000" dirty="0">
+                <a:sym typeface="Wingdings" panose="05000000000000000000" pitchFamily="2" charset="2"/>
+              </a:rPr>
+              <a:t>)</a:t>
+            </a:r>
+          </a:p>
+          <a:p>
+            <a:pPr marL="445770" indent="-342900">
+              <a:buFont typeface="Arial" panose="020B0604020202020204" pitchFamily="34" charset="0"/>
+              <a:buChar char="•"/>
+            </a:pPr>
+            <a:r>
+              <a:rPr lang="en-US" sz="2000" dirty="0">
+                <a:sym typeface="Wingdings" panose="05000000000000000000" pitchFamily="2" charset="2"/>
+              </a:rPr>
+              <a:t>GPS-</a:t>
+            </a:r>
+            <a:r>
+              <a:rPr lang="en-US" sz="2000" dirty="0" err="1">
+                <a:sym typeface="Wingdings" panose="05000000000000000000" pitchFamily="2" charset="2"/>
+              </a:rPr>
+              <a:t>coördinaten</a:t>
+            </a:r>
+            <a:r>
+              <a:rPr lang="en-US" sz="2000" dirty="0">
+                <a:sym typeface="Wingdings" panose="05000000000000000000" pitchFamily="2" charset="2"/>
+              </a:rPr>
+              <a:t> </a:t>
+            </a:r>
+            <a:r>
+              <a:rPr lang="en-US" sz="2000" dirty="0" err="1">
+                <a:sym typeface="Wingdings" panose="05000000000000000000" pitchFamily="2" charset="2"/>
+              </a:rPr>
+              <a:t>doorsturen</a:t>
+            </a:r>
+            <a:r>
+              <a:rPr lang="en-US" sz="2000" dirty="0">
+                <a:sym typeface="Wingdings" panose="05000000000000000000" pitchFamily="2" charset="2"/>
+              </a:rPr>
+              <a:t> (Jonas)</a:t>
+            </a:r>
+          </a:p>
+          <a:p>
+            <a:pPr marL="445770" indent="-342900">
+              <a:buFont typeface="Arial" panose="020B0604020202020204" pitchFamily="34" charset="0"/>
+              <a:buChar char="•"/>
+            </a:pPr>
+            <a:endParaRPr lang="en-US" sz="2000" dirty="0">
+              <a:sym typeface="Wingdings" panose="05000000000000000000" pitchFamily="2" charset="2"/>
+            </a:endParaRPr>
+          </a:p>
+          <a:p>
+            <a:pPr marL="445770" indent="-342900">
+              <a:buFont typeface="+mj-lt"/>
+              <a:buAutoNum type="arabicPeriod"/>
+            </a:pPr>
+            <a:endParaRPr lang="en-US" sz="2000" dirty="0">
+              <a:sym typeface="Wingdings" panose="05000000000000000000" pitchFamily="2" charset="2"/>
+            </a:endParaRPr>
+          </a:p>
+          <a:p>
+            <a:pPr marL="445770" indent="-342900">
+              <a:buFont typeface="+mj-lt"/>
+              <a:buAutoNum type="arabicPeriod"/>
+            </a:pPr>
+            <a:endParaRPr lang="en-US" sz="2000" dirty="0">
+              <a:sym typeface="Wingdings" panose="05000000000000000000" pitchFamily="2" charset="2"/>
+            </a:endParaRPr>
+          </a:p>
+          <a:p>
+            <a:pPr marL="445770" indent="-342900">
+              <a:buFont typeface="+mj-lt"/>
+              <a:buAutoNum type="arabicPeriod"/>
+            </a:pPr>
+            <a:endParaRPr lang="en-US" sz="2000" dirty="0">
+              <a:sym typeface="Wingdings" panose="05000000000000000000" pitchFamily="2" charset="2"/>
+            </a:endParaRPr>
+          </a:p>
+          <a:p>
+            <a:pPr marL="445770" indent="-342900">
+              <a:buFont typeface="+mj-lt"/>
+              <a:buAutoNum type="arabicPeriod"/>
+            </a:pPr>
+            <a:endParaRPr lang="en-US" sz="2000" dirty="0">
+              <a:sym typeface="Wingdings" panose="05000000000000000000" pitchFamily="2" charset="2"/>
+            </a:endParaRPr>
+          </a:p>
+          <a:p>
+            <a:pPr marL="411480" lvl="1" indent="0">
+              <a:buNone/>
+            </a:pPr>
+            <a:endParaRPr lang="en-US" sz="1820" dirty="0"/>
+          </a:p>
+          <a:p>
+            <a:pPr lvl="1"/>
+            <a:endParaRPr lang="en-US" sz="1820" dirty="0"/>
+          </a:p>
+        </p:txBody>
+      </p:sp>
+      <p:sp>
+        <p:nvSpPr>
+          <p:cNvPr id="5" name="Slide Number Placeholder 4"/>
+          <p:cNvSpPr>
+            <a:spLocks noGrp="1"/>
+          </p:cNvSpPr>
+          <p:nvPr>
+            <p:ph type="sldNum" sz="quarter" idx="12"/>
+          </p:nvPr>
+        </p:nvSpPr>
+        <p:spPr/>
+        <p:txBody>
+          <a:bodyPr/>
+          <a:lstStyle/>
+          <a:p>
+            <a:fld id="{8836216C-5BC3-7C44-80F8-E30864FFC228}" type="slidenum">
+              <a:rPr lang="en-US" smtClean="0"/>
+              <a:t>13</a:t>
+            </a:fld>
+            <a:endParaRPr lang="en-US" dirty="0"/>
+          </a:p>
+        </p:txBody>
+      </p:sp>
+    </p:spTree>
+    <p:extLst>
+      <p:ext uri="{BB962C8B-B14F-4D97-AF65-F5344CB8AC3E}">
+        <p14:creationId xmlns:p14="http://schemas.microsoft.com/office/powerpoint/2010/main" val="2120418888"/>
+      </p:ext>
+    </p:extLst>
+  </p:cSld>
+  <p:clrMapOvr>
+    <a:masterClrMapping/>
+  </p:clrMapOvr>
+  <mc:AlternateContent xmlns:mc="http://schemas.openxmlformats.org/markup-compatibility/2006" xmlns:p14="http://schemas.microsoft.com/office/powerpoint/2010/main">
+    <mc:Choice Requires="p14">
+      <p:transition spd="med" p14:dur="700">
+        <p:fade/>
+      </p:transition>
+    </mc:Choice>
+    <mc:Fallback xmlns="">
+      <p:transition spd="med">
+        <p:fade/>
+      </p:transition>
+    </mc:Fallback>
+  </mc:AlternateContent>
+</p:sld>
+</file>
+
+<file path=ppt/slides/slide14.xml><?xml version="1.0" encoding="utf-8"?>
+<p:sld xmlns:a="http://schemas.openxmlformats.org/drawingml/2006/main" xmlns:r="http://schemas.openxmlformats.org/officeDocument/2006/relationships" xmlns:p="http://schemas.openxmlformats.org/presentationml/2006/main">
+  <p:cSld>
+    <p:bg>
+      <p:bgPr>
+        <a:gradFill>
+          <a:gsLst>
+            <a:gs pos="0">
+              <a:srgbClr val="C00000"/>
+            </a:gs>
+            <a:gs pos="100000">
+              <a:schemeClr val="tx2"/>
+            </a:gs>
+          </a:gsLst>
+          <a:lin ang="2700000" scaled="0"/>
+        </a:gradFill>
+        <a:effectLst/>
+      </p:bgPr>
+    </p:bg>
+    <p:spTree>
+      <p:nvGrpSpPr>
+        <p:cNvPr id="1" name=""/>
+        <p:cNvGrpSpPr/>
+        <p:nvPr/>
+      </p:nvGrpSpPr>
+      <p:grpSpPr>
+        <a:xfrm>
+          <a:off x="0" y="0"/>
+          <a:ext cx="0" cy="0"/>
+          <a:chOff x="0" y="0"/>
+          <a:chExt cx="0" cy="0"/>
+        </a:xfrm>
+      </p:grpSpPr>
+      <p:sp>
+        <p:nvSpPr>
+          <p:cNvPr id="2" name="Titel 1">
+            <a:extLst>
+              <a:ext uri="{FF2B5EF4-FFF2-40B4-BE49-F238E27FC236}">
+                <a16:creationId xmlns:a16="http://schemas.microsoft.com/office/drawing/2014/main" id="{3DD11527-6223-4E4A-BF2F-EE12EB67F4D6}"/>
+              </a:ext>
+            </a:extLst>
+          </p:cNvPr>
+          <p:cNvSpPr>
+            <a:spLocks noGrp="1"/>
+          </p:cNvSpPr>
+          <p:nvPr>
+            <p:ph type="title"/>
+          </p:nvPr>
+        </p:nvSpPr>
+        <p:spPr>
+          <a:xfrm>
+            <a:off x="152401" y="2309142"/>
+            <a:ext cx="8839200" cy="523220"/>
+          </a:xfrm>
+        </p:spPr>
+        <p:txBody>
+          <a:bodyPr/>
+          <a:lstStyle/>
+          <a:p>
+            <a:r>
+              <a:rPr lang="en-US" sz="2800" dirty="0"/>
+              <a:t>DEMO time!</a:t>
+            </a:r>
+          </a:p>
+        </p:txBody>
+      </p:sp>
       <p:pic>
         <p:nvPicPr>
-          <p:cNvPr id="3076" name="Picture 4" descr="Afbeeldingsresultaat voor embrace elderly">
+          <p:cNvPr id="3" name="Picture 4" descr="Afbeeldingsresultaat voor embrace elderly">
             <a:extLst>
               <a:ext uri="{FF2B5EF4-FFF2-40B4-BE49-F238E27FC236}">
-                <a16:creationId xmlns:a16="http://schemas.microsoft.com/office/drawing/2014/main" id="{DCF3D790-4E8F-4818-BCBA-B9644A6CC238}"/>
+                <a16:creationId xmlns:a16="http://schemas.microsoft.com/office/drawing/2014/main" id="{E0BB7899-104A-4CFA-9AF8-52D793088863}"/>
               </a:ext>
             </a:extLst>
           </p:cNvPr>
@@ -14273,7 +15193,7 @@
     </p:spTree>
     <p:extLst>
       <p:ext uri="{BB962C8B-B14F-4D97-AF65-F5344CB8AC3E}">
-        <p14:creationId xmlns:p14="http://schemas.microsoft.com/office/powerpoint/2010/main" val="2931889757"/>
+        <p14:creationId xmlns:p14="http://schemas.microsoft.com/office/powerpoint/2010/main" val="3613720061"/>
       </p:ext>
     </p:extLst>
   </p:cSld>
@@ -14328,8 +15248,8 @@
           <a:lstStyle/>
           <a:p>
             <a:r>
-              <a:rPr lang="en-US" dirty="0" err="1"/>
-              <a:t>INhoud</a:t>
+              <a:rPr lang="en-US"/>
+              <a:t>Inhoud</a:t>
             </a:r>
             <a:endParaRPr lang="en-US" dirty="0"/>
           </a:p>
@@ -14353,20 +15273,33 @@
           <a:lstStyle/>
           <a:p>
             <a:r>
+              <a:rPr lang="en-US" sz="2000" dirty="0" err="1"/>
+              <a:t>Overzicht</a:t>
+            </a:r>
+            <a:r>
               <a:rPr lang="en-US" sz="2000" dirty="0"/>
-              <a:t>Topics</a:t>
-            </a:r>
-          </a:p>
-          <a:p>
+              <a:t> &amp; planning</a:t>
+            </a:r>
+          </a:p>
+          <a:p>
+            <a:r>
+              <a:rPr lang="en-US" sz="2000" dirty="0" err="1"/>
+              <a:t>Gerealiseerd</a:t>
+            </a:r>
+            <a:endParaRPr lang="en-US" sz="2000" dirty="0"/>
+          </a:p>
+          <a:p>
+            <a:r>
+              <a:rPr lang="en-US" sz="2000" dirty="0" err="1"/>
+              <a:t>Niet</a:t>
+            </a:r>
             <a:r>
               <a:rPr lang="en-US" sz="2000" dirty="0"/>
-              <a:t>Planning</a:t>
-            </a:r>
-          </a:p>
-          <a:p>
+              <a:t> </a:t>
+            </a:r>
             <a:r>
               <a:rPr lang="en-US" sz="2000" dirty="0" err="1"/>
-              <a:t>Taakverdeling</a:t>
+              <a:t>gerealiseerd</a:t>
             </a:r>
             <a:endParaRPr lang="en-US" sz="2000" dirty="0"/>
           </a:p>
@@ -14527,7 +15460,7 @@
           <a:p>
             <a:r>
               <a:rPr lang="en-US" dirty="0"/>
-              <a:t>Topics</a:t>
+              <a:t>Planning</a:t>
             </a:r>
           </a:p>
         </p:txBody>
@@ -14644,7 +15577,143 @@
           <a:p>
             <a:r>
               <a:rPr lang="en-US" dirty="0"/>
-              <a:t>Topics</a:t>
+              <a:t>Planning</a:t>
+            </a:r>
+          </a:p>
+        </p:txBody>
+      </p:sp>
+      <p:sp>
+        <p:nvSpPr>
+          <p:cNvPr id="5" name="Slide Number Placeholder 4"/>
+          <p:cNvSpPr>
+            <a:spLocks noGrp="1"/>
+          </p:cNvSpPr>
+          <p:nvPr>
+            <p:ph type="sldNum" sz="quarter" idx="12"/>
+          </p:nvPr>
+        </p:nvSpPr>
+        <p:spPr/>
+        <p:txBody>
+          <a:bodyPr/>
+          <a:lstStyle/>
+          <a:p>
+            <a:fld id="{8836216C-5BC3-7C44-80F8-E30864FFC228}" type="slidenum">
+              <a:rPr lang="en-US" smtClean="0"/>
+              <a:t>4</a:t>
+            </a:fld>
+            <a:endParaRPr lang="en-US"/>
+          </a:p>
+        </p:txBody>
+      </p:sp>
+      <p:sp>
+        <p:nvSpPr>
+          <p:cNvPr id="4" name="Text Placeholder 3"/>
+          <p:cNvSpPr>
+            <a:spLocks noGrp="1"/>
+          </p:cNvSpPr>
+          <p:nvPr>
+            <p:ph type="body" sz="quarter" idx="13"/>
+          </p:nvPr>
+        </p:nvSpPr>
+        <p:spPr/>
+        <p:txBody>
+          <a:bodyPr/>
+          <a:lstStyle/>
+          <a:p>
+            <a:endParaRPr lang="en-US" dirty="0"/>
+          </a:p>
+        </p:txBody>
+      </p:sp>
+      <p:pic>
+        <p:nvPicPr>
+          <p:cNvPr id="8" name="Afbeelding 7">
+            <a:extLst>
+              <a:ext uri="{FF2B5EF4-FFF2-40B4-BE49-F238E27FC236}">
+                <a16:creationId xmlns:a16="http://schemas.microsoft.com/office/drawing/2014/main" id="{73FA4D87-08B3-43DA-A0A5-77A675779339}"/>
+              </a:ext>
+            </a:extLst>
+          </p:cNvPr>
+          <p:cNvPicPr>
+            <a:picLocks noChangeAspect="1"/>
+          </p:cNvPicPr>
+          <p:nvPr/>
+        </p:nvPicPr>
+        <p:blipFill>
+          <a:blip r:embed="rId2"/>
+          <a:stretch>
+            <a:fillRect/>
+          </a:stretch>
+        </p:blipFill>
+        <p:spPr>
+          <a:xfrm>
+            <a:off x="89105" y="1533236"/>
+            <a:ext cx="8825001" cy="1960679"/>
+          </a:xfrm>
+          <a:prstGeom prst="rect">
+            <a:avLst/>
+          </a:prstGeom>
+        </p:spPr>
+      </p:pic>
+    </p:spTree>
+    <p:extLst>
+      <p:ext uri="{BB962C8B-B14F-4D97-AF65-F5344CB8AC3E}">
+        <p14:creationId xmlns:p14="http://schemas.microsoft.com/office/powerpoint/2010/main" val="1235786041"/>
+      </p:ext>
+    </p:extLst>
+  </p:cSld>
+  <p:clrMapOvr>
+    <a:masterClrMapping/>
+  </p:clrMapOvr>
+  <mc:AlternateContent xmlns:mc="http://schemas.openxmlformats.org/markup-compatibility/2006" xmlns:p14="http://schemas.microsoft.com/office/powerpoint/2010/main">
+    <mc:Choice Requires="p14">
+      <p:transition spd="med" p14:dur="700">
+        <p:fade/>
+      </p:transition>
+    </mc:Choice>
+    <mc:Fallback xmlns="">
+      <p:transition spd="med">
+        <p:fade/>
+      </p:transition>
+    </mc:Fallback>
+  </mc:AlternateContent>
+</p:sld>
+</file>
+
+<file path=ppt/slides/slide5.xml><?xml version="1.0" encoding="utf-8"?>
+<p:sld xmlns:a="http://schemas.openxmlformats.org/drawingml/2006/main" xmlns:r="http://schemas.openxmlformats.org/officeDocument/2006/relationships" xmlns:p="http://schemas.openxmlformats.org/presentationml/2006/main">
+  <p:cSld>
+    <p:spTree>
+      <p:nvGrpSpPr>
+        <p:cNvPr id="1" name=""/>
+        <p:cNvGrpSpPr/>
+        <p:nvPr/>
+      </p:nvGrpSpPr>
+      <p:grpSpPr>
+        <a:xfrm>
+          <a:off x="0" y="0"/>
+          <a:ext cx="0" cy="0"/>
+          <a:chOff x="0" y="0"/>
+          <a:chExt cx="0" cy="0"/>
+        </a:xfrm>
+      </p:grpSpPr>
+      <p:sp>
+        <p:nvSpPr>
+          <p:cNvPr id="2" name="Title 1"/>
+          <p:cNvSpPr>
+            <a:spLocks noGrp="1"/>
+          </p:cNvSpPr>
+          <p:nvPr>
+            <p:ph type="title"/>
+          </p:nvPr>
+        </p:nvSpPr>
+        <p:spPr/>
+        <p:txBody>
+          <a:bodyPr/>
+          <a:lstStyle/>
+          <a:p>
+            <a:r>
+              <a:rPr lang="en-US" dirty="0"/>
+              <a:t>Planning</a:t>
             </a:r>
           </a:p>
         </p:txBody>
@@ -14871,7 +15940,7 @@
           <a:p>
             <a:fld id="{8836216C-5BC3-7C44-80F8-E30864FFC228}" type="slidenum">
               <a:rPr lang="en-US" smtClean="0"/>
-              <a:t>4</a:t>
+              <a:t>5</a:t>
             </a:fld>
             <a:endParaRPr lang="en-US"/>
           </a:p>
@@ -15013,377 +16082,7 @@
     </p:spTree>
     <p:extLst>
       <p:ext uri="{BB962C8B-B14F-4D97-AF65-F5344CB8AC3E}">
-        <p14:creationId xmlns:p14="http://schemas.microsoft.com/office/powerpoint/2010/main" val="1235786041"/>
-      </p:ext>
-    </p:extLst>
-  </p:cSld>
-  <p:clrMapOvr>
-    <a:masterClrMapping/>
-  </p:clrMapOvr>
-  <mc:AlternateContent xmlns:mc="http://schemas.openxmlformats.org/markup-compatibility/2006" xmlns:p14="http://schemas.microsoft.com/office/powerpoint/2010/main">
-    <mc:Choice Requires="p14">
-      <p:transition spd="med" p14:dur="700">
-        <p:fade/>
-      </p:transition>
-    </mc:Choice>
-    <mc:Fallback xmlns="">
-      <p:transition spd="med">
-        <p:fade/>
-      </p:transition>
-    </mc:Fallback>
-  </mc:AlternateContent>
-</p:sld>
-</file>
-
-<file path=ppt/slides/slide5.xml><?xml version="1.0" encoding="utf-8"?>
-<p:sld xmlns:a="http://schemas.openxmlformats.org/drawingml/2006/main" xmlns:r="http://schemas.openxmlformats.org/officeDocument/2006/relationships" xmlns:p="http://schemas.openxmlformats.org/presentationml/2006/main">
-  <p:cSld>
-    <p:spTree>
-      <p:nvGrpSpPr>
-        <p:cNvPr id="1" name=""/>
-        <p:cNvGrpSpPr/>
-        <p:nvPr/>
-      </p:nvGrpSpPr>
-      <p:grpSpPr>
-        <a:xfrm>
-          <a:off x="0" y="0"/>
-          <a:ext cx="0" cy="0"/>
-          <a:chOff x="0" y="0"/>
-          <a:chExt cx="0" cy="0"/>
-        </a:xfrm>
-      </p:grpSpPr>
-      <p:sp>
-        <p:nvSpPr>
-          <p:cNvPr id="2" name="Title 1"/>
-          <p:cNvSpPr>
-            <a:spLocks noGrp="1"/>
-          </p:cNvSpPr>
-          <p:nvPr>
-            <p:ph type="title"/>
-          </p:nvPr>
-        </p:nvSpPr>
-        <p:spPr/>
-        <p:txBody>
-          <a:bodyPr/>
-          <a:lstStyle/>
-          <a:p>
-            <a:r>
-              <a:rPr lang="en-US" dirty="0"/>
-              <a:t>Topics</a:t>
-            </a:r>
-          </a:p>
-        </p:txBody>
-      </p:sp>
-      <p:sp>
-        <p:nvSpPr>
-          <p:cNvPr id="3" name="Content Placeholder 2"/>
-          <p:cNvSpPr>
-            <a:spLocks noGrp="1"/>
-          </p:cNvSpPr>
-          <p:nvPr>
-            <p:ph idx="1"/>
-          </p:nvPr>
-        </p:nvSpPr>
-        <p:spPr>
-          <a:xfrm>
-            <a:off x="160631" y="1078229"/>
-            <a:ext cx="8753475" cy="3815767"/>
-          </a:xfrm>
-        </p:spPr>
-        <p:txBody>
-          <a:bodyPr anchor="t">
-            <a:normAutofit/>
-          </a:bodyPr>
-          <a:lstStyle/>
-          <a:p>
-            <a:r>
-              <a:rPr lang="en-US" sz="2000" dirty="0"/>
-              <a:t>GPS-</a:t>
-            </a:r>
-            <a:r>
-              <a:rPr lang="en-US" sz="2000" dirty="0" err="1"/>
-              <a:t>coördinaten</a:t>
-            </a:r>
-            <a:r>
-              <a:rPr lang="en-US" sz="2000" dirty="0"/>
-              <a:t> via </a:t>
-            </a:r>
-            <a:r>
-              <a:rPr lang="en-US" sz="2000" dirty="0" err="1"/>
-              <a:t>LoRaWAN</a:t>
-            </a:r>
-            <a:r>
-              <a:rPr lang="en-US" sz="2000" dirty="0"/>
-              <a:t> </a:t>
-            </a:r>
-            <a:r>
-              <a:rPr lang="en-US" sz="2000" dirty="0" err="1"/>
-              <a:t>versturen</a:t>
-            </a:r>
-            <a:endParaRPr lang="en-US" sz="2000" dirty="0"/>
-          </a:p>
-          <a:p>
-            <a:pPr lvl="1"/>
-            <a:r>
-              <a:rPr lang="en-US" sz="1640" dirty="0"/>
-              <a:t>GPS-module </a:t>
-            </a:r>
-            <a:r>
-              <a:rPr lang="en-US" sz="1640" dirty="0" err="1"/>
-              <a:t>solderen</a:t>
-            </a:r>
-            <a:endParaRPr lang="en-US" sz="1640" dirty="0"/>
-          </a:p>
-          <a:p>
-            <a:pPr lvl="1"/>
-            <a:r>
-              <a:rPr lang="en-US" sz="1640" dirty="0" err="1"/>
-              <a:t>Coördinaten</a:t>
-            </a:r>
-            <a:r>
-              <a:rPr lang="en-US" sz="1640" dirty="0"/>
-              <a:t> </a:t>
-            </a:r>
-            <a:r>
-              <a:rPr lang="en-US" sz="1640" dirty="0" err="1"/>
-              <a:t>converteren</a:t>
-            </a:r>
-            <a:endParaRPr lang="en-US" sz="1640" dirty="0"/>
-          </a:p>
-          <a:p>
-            <a:pPr lvl="1"/>
-            <a:r>
-              <a:rPr lang="en-US" sz="1640" dirty="0" err="1"/>
-              <a:t>Verbinden</a:t>
-            </a:r>
-            <a:r>
-              <a:rPr lang="en-US" sz="1640" dirty="0"/>
-              <a:t> met </a:t>
-            </a:r>
-            <a:r>
-              <a:rPr lang="en-US" sz="1640" dirty="0" err="1"/>
-              <a:t>LoRaWAN</a:t>
-            </a:r>
-            <a:r>
-              <a:rPr lang="en-US" sz="1640" dirty="0"/>
-              <a:t> gateway</a:t>
-            </a:r>
-          </a:p>
-          <a:p>
-            <a:pPr lvl="1"/>
-            <a:r>
-              <a:rPr lang="en-US" sz="1640" dirty="0"/>
-              <a:t>Backend: GPS </a:t>
-            </a:r>
-            <a:r>
-              <a:rPr lang="en-US" sz="1640" dirty="0" err="1"/>
-              <a:t>aanzetten</a:t>
-            </a:r>
-            <a:r>
-              <a:rPr lang="en-US" sz="1640" dirty="0"/>
-              <a:t> </a:t>
-            </a:r>
-            <a:r>
-              <a:rPr lang="en-US" sz="1640" dirty="0" err="1"/>
-              <a:t>indien</a:t>
-            </a:r>
-            <a:r>
-              <a:rPr lang="en-US" sz="1640" dirty="0"/>
-              <a:t> </a:t>
-            </a:r>
-            <a:r>
-              <a:rPr lang="en-US" sz="1640" dirty="0" err="1"/>
-              <a:t>buiten</a:t>
-            </a:r>
-            <a:r>
-              <a:rPr lang="en-US" sz="1640" dirty="0"/>
-              <a:t> </a:t>
-            </a:r>
-            <a:r>
-              <a:rPr lang="en-US" sz="1640" dirty="0" err="1"/>
-              <a:t>safezone</a:t>
-            </a:r>
-            <a:r>
-              <a:rPr lang="en-US" sz="1640" dirty="0"/>
-              <a:t> (input van DASH7)</a:t>
-            </a:r>
-          </a:p>
-          <a:p>
-            <a:pPr lvl="1"/>
-            <a:endParaRPr lang="en-US" sz="1640" dirty="0"/>
-          </a:p>
-          <a:p>
-            <a:r>
-              <a:rPr lang="en-US" sz="1820" dirty="0"/>
-              <a:t>DASH7 fingerprinting</a:t>
-            </a:r>
-          </a:p>
-          <a:p>
-            <a:pPr lvl="1"/>
-            <a:r>
-              <a:rPr lang="en-US" sz="1640" dirty="0"/>
-              <a:t>Database </a:t>
-            </a:r>
-            <a:r>
-              <a:rPr lang="en-US" sz="1640" dirty="0" err="1"/>
-              <a:t>opstellen</a:t>
-            </a:r>
-            <a:r>
-              <a:rPr lang="en-US" sz="1640" dirty="0"/>
-              <a:t> met RSSI (no response </a:t>
-            </a:r>
-            <a:r>
-              <a:rPr lang="en-US" sz="1640" dirty="0">
-                <a:sym typeface="Wingdings" panose="05000000000000000000" pitchFamily="2" charset="2"/>
-              </a:rPr>
-              <a:t></a:t>
-            </a:r>
-            <a:r>
-              <a:rPr lang="en-US" sz="1640" dirty="0"/>
-              <a:t> delete entry)</a:t>
-            </a:r>
-          </a:p>
-          <a:p>
-            <a:pPr lvl="1"/>
-            <a:r>
-              <a:rPr lang="en-US" sz="1640" dirty="0"/>
-              <a:t>Node </a:t>
-            </a:r>
-            <a:r>
-              <a:rPr lang="en-US" sz="1640" dirty="0" err="1"/>
-              <a:t>zendt</a:t>
-            </a:r>
-            <a:r>
-              <a:rPr lang="en-US" sz="1640" dirty="0"/>
-              <a:t> RSSI meting</a:t>
-            </a:r>
-          </a:p>
-          <a:p>
-            <a:pPr lvl="1"/>
-            <a:r>
-              <a:rPr lang="en-US" sz="1640" dirty="0" err="1"/>
-              <a:t>Algoritme</a:t>
-            </a:r>
-            <a:r>
-              <a:rPr lang="en-US" sz="1640" dirty="0"/>
-              <a:t> </a:t>
-            </a:r>
-            <a:r>
-              <a:rPr lang="en-US" sz="1640" dirty="0" err="1"/>
-              <a:t>voor</a:t>
-            </a:r>
-            <a:r>
-              <a:rPr lang="en-US" sz="1640" dirty="0"/>
-              <a:t> pattern matching </a:t>
-            </a:r>
-            <a:r>
-              <a:rPr lang="en-US" sz="1640" dirty="0">
-                <a:sym typeface="Wingdings" panose="05000000000000000000" pitchFamily="2" charset="2"/>
-              </a:rPr>
-              <a:t> </a:t>
-            </a:r>
-            <a:r>
-              <a:rPr lang="en-US" sz="1640" dirty="0" err="1">
-                <a:sym typeface="Wingdings" panose="05000000000000000000" pitchFamily="2" charset="2"/>
-              </a:rPr>
-              <a:t>uitvoeren</a:t>
-            </a:r>
-            <a:r>
-              <a:rPr lang="en-US" sz="1640" dirty="0">
-                <a:sym typeface="Wingdings" panose="05000000000000000000" pitchFamily="2" charset="2"/>
-              </a:rPr>
-              <a:t> op backend (Ubuntu-server)</a:t>
-            </a:r>
-          </a:p>
-          <a:p>
-            <a:pPr lvl="1"/>
-            <a:endParaRPr lang="en-US" sz="1640" dirty="0"/>
-          </a:p>
-          <a:p>
-            <a:pPr lvl="1"/>
-            <a:endParaRPr lang="en-US" sz="1640" dirty="0"/>
-          </a:p>
-          <a:p>
-            <a:pPr lvl="1"/>
-            <a:endParaRPr lang="en-US" sz="1640" dirty="0"/>
-          </a:p>
-          <a:p>
-            <a:pPr lvl="1"/>
-            <a:endParaRPr lang="en-US" sz="1640" dirty="0"/>
-          </a:p>
-          <a:p>
-            <a:pPr lvl="1"/>
-            <a:endParaRPr lang="en-US" sz="1820" dirty="0"/>
-          </a:p>
-          <a:p>
-            <a:pPr lvl="1"/>
-            <a:endParaRPr lang="en-US" sz="1820" dirty="0"/>
-          </a:p>
-          <a:p>
-            <a:pPr lvl="1"/>
-            <a:endParaRPr lang="en-US" sz="1820" dirty="0"/>
-          </a:p>
-          <a:p>
-            <a:pPr lvl="1"/>
-            <a:endParaRPr lang="en-US" sz="1820" dirty="0"/>
-          </a:p>
-          <a:p>
-            <a:endParaRPr lang="en-US" sz="2000" dirty="0"/>
-          </a:p>
-          <a:p>
-            <a:endParaRPr lang="en-US" sz="2000" dirty="0"/>
-          </a:p>
-        </p:txBody>
-      </p:sp>
-      <p:sp>
-        <p:nvSpPr>
-          <p:cNvPr id="5" name="Slide Number Placeholder 4"/>
-          <p:cNvSpPr>
-            <a:spLocks noGrp="1"/>
-          </p:cNvSpPr>
-          <p:nvPr>
-            <p:ph type="sldNum" sz="quarter" idx="12"/>
-          </p:nvPr>
-        </p:nvSpPr>
-        <p:spPr/>
-        <p:txBody>
-          <a:bodyPr/>
-          <a:lstStyle/>
-          <a:p>
-            <a:fld id="{8836216C-5BC3-7C44-80F8-E30864FFC228}" type="slidenum">
-              <a:rPr lang="en-US" smtClean="0"/>
-              <a:t>5</a:t>
-            </a:fld>
-            <a:endParaRPr lang="en-US"/>
-          </a:p>
-        </p:txBody>
-      </p:sp>
-      <p:sp>
-        <p:nvSpPr>
-          <p:cNvPr id="4" name="Text Placeholder 3"/>
-          <p:cNvSpPr>
-            <a:spLocks noGrp="1"/>
-          </p:cNvSpPr>
-          <p:nvPr>
-            <p:ph type="body" sz="quarter" idx="13"/>
-          </p:nvPr>
-        </p:nvSpPr>
-        <p:spPr/>
-        <p:txBody>
-          <a:bodyPr/>
-          <a:lstStyle/>
-          <a:p>
-            <a:r>
-              <a:rPr lang="en-US" dirty="0"/>
-              <a:t>In detail</a:t>
-            </a:r>
-          </a:p>
-        </p:txBody>
-      </p:sp>
-    </p:spTree>
-    <p:extLst>
-      <p:ext uri="{BB962C8B-B14F-4D97-AF65-F5344CB8AC3E}">
-        <p14:creationId xmlns:p14="http://schemas.microsoft.com/office/powerpoint/2010/main" val="2159170576"/>
+        <p14:creationId xmlns:p14="http://schemas.microsoft.com/office/powerpoint/2010/main" val="454203375"/>
       </p:ext>
     </p:extLst>
   </p:cSld>
@@ -15439,7 +16138,7 @@
           <a:p>
             <a:r>
               <a:rPr lang="en-US" dirty="0"/>
-              <a:t>Topics</a:t>
+              <a:t>Planning</a:t>
             </a:r>
           </a:p>
         </p:txBody>
@@ -15454,7 +16153,12 @@
             <p:ph idx="1"/>
           </p:nvPr>
         </p:nvSpPr>
-        <p:spPr/>
+        <p:spPr>
+          <a:xfrm>
+            <a:off x="160631" y="1078229"/>
+            <a:ext cx="8753475" cy="3815767"/>
+          </a:xfrm>
+        </p:spPr>
         <p:txBody>
           <a:bodyPr anchor="t">
             <a:normAutofit/>
@@ -15462,203 +16166,241 @@
           <a:lstStyle/>
           <a:p>
             <a:r>
+              <a:rPr lang="en-US" sz="2000" dirty="0"/>
+              <a:t>GPS-</a:t>
+            </a:r>
+            <a:r>
               <a:rPr lang="en-US" sz="2000" dirty="0" err="1"/>
-              <a:t>eCompass</a:t>
+              <a:t>coördinaten</a:t>
+            </a:r>
+            <a:r>
+              <a:rPr lang="en-US" sz="2000" dirty="0"/>
+              <a:t> via </a:t>
+            </a:r>
+            <a:r>
+              <a:rPr lang="en-US" sz="2000" dirty="0" err="1"/>
+              <a:t>LoRaWAN</a:t>
+            </a:r>
+            <a:r>
+              <a:rPr lang="en-US" sz="2000" dirty="0"/>
+              <a:t> </a:t>
+            </a:r>
+            <a:r>
+              <a:rPr lang="en-US" sz="2000" dirty="0" err="1"/>
+              <a:t>versturen</a:t>
             </a:r>
             <a:endParaRPr lang="en-US" sz="2000" dirty="0"/>
           </a:p>
           <a:p>
             <a:pPr lvl="1"/>
             <a:r>
+              <a:rPr lang="en-US" sz="1640" dirty="0"/>
+              <a:t>GPS-module </a:t>
+            </a:r>
+            <a:r>
+              <a:rPr lang="en-US" sz="1640" dirty="0" err="1"/>
+              <a:t>solderen</a:t>
+            </a:r>
+            <a:endParaRPr lang="en-US" sz="1640" dirty="0"/>
+          </a:p>
+          <a:p>
+            <a:pPr lvl="1"/>
+            <a:r>
+              <a:rPr lang="en-US" sz="1640" dirty="0" err="1"/>
+              <a:t>Coördinaten</a:t>
+            </a:r>
+            <a:r>
+              <a:rPr lang="en-US" sz="1640" dirty="0"/>
+              <a:t> </a:t>
+            </a:r>
+            <a:r>
+              <a:rPr lang="en-US" sz="1640" dirty="0" err="1"/>
+              <a:t>converteren</a:t>
+            </a:r>
+            <a:endParaRPr lang="en-US" sz="1640" dirty="0"/>
+          </a:p>
+          <a:p>
+            <a:pPr lvl="1"/>
+            <a:r>
+              <a:rPr lang="en-US" sz="1640" dirty="0" err="1"/>
+              <a:t>Verbinden</a:t>
+            </a:r>
+            <a:r>
+              <a:rPr lang="en-US" sz="1640" dirty="0"/>
+              <a:t> met </a:t>
+            </a:r>
+            <a:r>
+              <a:rPr lang="en-US" sz="1640" dirty="0" err="1"/>
+              <a:t>LoRaWAN</a:t>
+            </a:r>
+            <a:r>
+              <a:rPr lang="en-US" sz="1640" dirty="0"/>
+              <a:t> gateway</a:t>
+            </a:r>
+          </a:p>
+          <a:p>
+            <a:pPr lvl="1"/>
+            <a:r>
+              <a:rPr lang="en-US" sz="1640" dirty="0"/>
+              <a:t>Backend: GPS </a:t>
+            </a:r>
+            <a:r>
+              <a:rPr lang="en-US" sz="1640" dirty="0" err="1"/>
+              <a:t>aanzetten</a:t>
+            </a:r>
+            <a:r>
+              <a:rPr lang="en-US" sz="1640" dirty="0"/>
+              <a:t> </a:t>
+            </a:r>
+            <a:r>
+              <a:rPr lang="en-US" sz="1640" dirty="0" err="1"/>
+              <a:t>indien</a:t>
+            </a:r>
+            <a:r>
+              <a:rPr lang="en-US" sz="1640" dirty="0"/>
+              <a:t> </a:t>
+            </a:r>
+            <a:r>
+              <a:rPr lang="en-US" sz="1640" dirty="0" err="1"/>
+              <a:t>buiten</a:t>
+            </a:r>
+            <a:r>
+              <a:rPr lang="en-US" sz="1640" dirty="0"/>
+              <a:t> </a:t>
+            </a:r>
+            <a:r>
+              <a:rPr lang="en-US" sz="1640" dirty="0" err="1"/>
+              <a:t>safezone</a:t>
+            </a:r>
+            <a:r>
+              <a:rPr lang="en-US" sz="1640" dirty="0"/>
+              <a:t> (input van DASH7)</a:t>
+            </a:r>
+          </a:p>
+          <a:p>
+            <a:pPr lvl="1"/>
+            <a:endParaRPr lang="en-US" sz="1640" dirty="0"/>
+          </a:p>
+          <a:p>
+            <a:r>
               <a:rPr lang="en-US" sz="1820" dirty="0"/>
-              <a:t>Accelerometer (</a:t>
-            </a:r>
-            <a:r>
-              <a:rPr lang="en-US" sz="1820" dirty="0" err="1"/>
-              <a:t>gebruikt</a:t>
-            </a:r>
-            <a:r>
-              <a:rPr lang="en-US" sz="1820" dirty="0"/>
+              <a:t>DASH7 fingerprinting</a:t>
+            </a:r>
+          </a:p>
+          <a:p>
+            <a:pPr lvl="1"/>
+            <a:r>
+              <a:rPr lang="en-US" sz="1640" dirty="0"/>
+              <a:t>Database </a:t>
+            </a:r>
+            <a:r>
+              <a:rPr lang="en-US" sz="1640" dirty="0" err="1"/>
+              <a:t>opstellen</a:t>
+            </a:r>
+            <a:r>
+              <a:rPr lang="en-US" sz="1640" dirty="0"/>
+              <a:t> met RSSI (no response </a:t>
+            </a:r>
+            <a:r>
+              <a:rPr lang="en-US" sz="1640" dirty="0">
+                <a:sym typeface="Wingdings" panose="05000000000000000000" pitchFamily="2" charset="2"/>
+              </a:rPr>
+              <a:t></a:t>
+            </a:r>
+            <a:r>
+              <a:rPr lang="en-US" sz="1640" dirty="0"/>
+              <a:t> delete entry)</a:t>
+            </a:r>
+          </a:p>
+          <a:p>
+            <a:pPr lvl="1"/>
+            <a:r>
+              <a:rPr lang="en-US" sz="1640" dirty="0"/>
+              <a:t>Node </a:t>
+            </a:r>
+            <a:r>
+              <a:rPr lang="en-US" sz="1640" dirty="0" err="1"/>
+              <a:t>zendt</a:t>
+            </a:r>
+            <a:r>
+              <a:rPr lang="en-US" sz="1640" dirty="0"/>
+              <a:t> RSSI meting</a:t>
+            </a:r>
+          </a:p>
+          <a:p>
+            <a:pPr lvl="1"/>
+            <a:r>
+              <a:rPr lang="en-US" sz="1640" dirty="0" err="1"/>
+              <a:t>Algoritme</a:t>
+            </a:r>
+            <a:r>
+              <a:rPr lang="en-US" sz="1640" dirty="0"/>
               <a:t> </a:t>
             </a:r>
             <a:r>
-              <a:rPr lang="en-US" sz="1820" dirty="0" err="1"/>
-              <a:t>als</a:t>
-            </a:r>
-            <a:r>
-              <a:rPr lang="en-US" sz="1820" dirty="0"/>
-              <a:t> </a:t>
-            </a:r>
-            <a:r>
-              <a:rPr lang="en-US" sz="1820" dirty="0" err="1"/>
-              <a:t>gyroscoop</a:t>
-            </a:r>
-            <a:r>
-              <a:rPr lang="en-US" sz="1820" dirty="0"/>
-              <a:t>): x/y/z </a:t>
-            </a:r>
-            <a:r>
-              <a:rPr lang="en-US" sz="1820" dirty="0">
+              <a:rPr lang="en-US" sz="1640" dirty="0" err="1"/>
+              <a:t>voor</a:t>
+            </a:r>
+            <a:r>
+              <a:rPr lang="en-US" sz="1640" dirty="0"/>
+              <a:t> pattern matching </a:t>
+            </a:r>
+            <a:r>
+              <a:rPr lang="en-US" sz="1640" dirty="0">
                 <a:sym typeface="Wingdings" panose="05000000000000000000" pitchFamily="2" charset="2"/>
               </a:rPr>
               <a:t> </a:t>
             </a:r>
             <a:r>
-              <a:rPr lang="en-US" sz="1820" dirty="0" err="1">
+              <a:rPr lang="en-US" sz="1640" dirty="0" err="1">
                 <a:sym typeface="Wingdings" panose="05000000000000000000" pitchFamily="2" charset="2"/>
               </a:rPr>
-              <a:t>hoeken</a:t>
-            </a:r>
-            <a:endParaRPr lang="en-US" sz="1820" dirty="0">
-              <a:sym typeface="Wingdings" panose="05000000000000000000" pitchFamily="2" charset="2"/>
-            </a:endParaRPr>
-          </a:p>
-          <a:p>
-            <a:pPr lvl="1"/>
-            <a:r>
-              <a:rPr lang="en-US" sz="1820" dirty="0">
-                <a:sym typeface="Wingdings" panose="05000000000000000000" pitchFamily="2" charset="2"/>
-              </a:rPr>
-              <a:t>Magnetometer: x/y/z  </a:t>
-            </a:r>
-            <a:r>
-              <a:rPr lang="en-US" sz="1820" dirty="0" err="1">
-                <a:sym typeface="Wingdings" panose="05000000000000000000" pitchFamily="2" charset="2"/>
-              </a:rPr>
-              <a:t>hoeken</a:t>
-            </a:r>
-            <a:endParaRPr lang="en-US" sz="1820" dirty="0">
-              <a:sym typeface="Wingdings" panose="05000000000000000000" pitchFamily="2" charset="2"/>
-            </a:endParaRPr>
-          </a:p>
-          <a:p>
-            <a:pPr lvl="1"/>
-            <a:r>
-              <a:rPr lang="en-US" sz="1820" dirty="0">
-                <a:sym typeface="Wingdings" panose="05000000000000000000" pitchFamily="2" charset="2"/>
-              </a:rPr>
-              <a:t>Sensor fusion: accelerometer + magnetometer</a:t>
-            </a:r>
-          </a:p>
-          <a:p>
-            <a:pPr lvl="2">
-              <a:buFont typeface="Wingdings" panose="05000000000000000000" pitchFamily="2" charset="2"/>
-              <a:buChar char="à"/>
-            </a:pPr>
+              <a:t>uitvoeren</a:t>
+            </a:r>
             <a:r>
               <a:rPr lang="en-US" sz="1640" dirty="0">
                 <a:sym typeface="Wingdings" panose="05000000000000000000" pitchFamily="2" charset="2"/>
               </a:rPr>
-              <a:t>Tilt-compensated compass</a:t>
-            </a:r>
-          </a:p>
-          <a:p>
-            <a:pPr lvl="2">
-              <a:buFont typeface="Wingdings" panose="05000000000000000000" pitchFamily="2" charset="2"/>
-              <a:buChar char="à"/>
-            </a:pPr>
-            <a:endParaRPr lang="en-US" sz="1640" dirty="0">
-              <a:sym typeface="Wingdings" panose="05000000000000000000" pitchFamily="2" charset="2"/>
-            </a:endParaRPr>
-          </a:p>
-          <a:p>
-            <a:pPr marL="308610" lvl="2" indent="-308610"/>
-            <a:r>
-              <a:rPr lang="en-US" sz="2000" dirty="0">
-                <a:sym typeface="Wingdings" panose="05000000000000000000" pitchFamily="2" charset="2"/>
-              </a:rPr>
-              <a:t>Backend</a:t>
-            </a:r>
-          </a:p>
-          <a:p>
-            <a:pPr marL="720090" lvl="3" indent="-308610"/>
-            <a:r>
-              <a:rPr lang="en-US" sz="1820" dirty="0">
-                <a:sym typeface="Wingdings" panose="05000000000000000000" pitchFamily="2" charset="2"/>
-              </a:rPr>
-              <a:t>Thinghsboard.io: MQTT</a:t>
-            </a:r>
-          </a:p>
-          <a:p>
-            <a:pPr marL="720090" lvl="3" indent="-308610"/>
-            <a:r>
-              <a:rPr lang="en-US" sz="1820" dirty="0">
-                <a:sym typeface="Wingdings" panose="05000000000000000000" pitchFamily="2" charset="2"/>
-              </a:rPr>
-              <a:t>Fingerprinting </a:t>
-            </a:r>
-            <a:r>
-              <a:rPr lang="en-US" sz="1820" dirty="0" err="1">
-                <a:sym typeface="Wingdings" panose="05000000000000000000" pitchFamily="2" charset="2"/>
-              </a:rPr>
-              <a:t>algoritme</a:t>
-            </a:r>
-            <a:r>
-              <a:rPr lang="en-US" sz="1820" dirty="0">
-                <a:sym typeface="Wingdings" panose="05000000000000000000" pitchFamily="2" charset="2"/>
-              </a:rPr>
-              <a:t> op </a:t>
-            </a:r>
-            <a:r>
-              <a:rPr lang="en-US" sz="1820" dirty="0" err="1">
-                <a:sym typeface="Wingdings" panose="05000000000000000000" pitchFamily="2" charset="2"/>
-              </a:rPr>
-              <a:t>draaien</a:t>
-            </a:r>
-            <a:endParaRPr lang="en-US" sz="1820" dirty="0">
-              <a:sym typeface="Wingdings" panose="05000000000000000000" pitchFamily="2" charset="2"/>
-            </a:endParaRPr>
-          </a:p>
-          <a:p>
-            <a:pPr marL="720090" lvl="3" indent="-308610"/>
-            <a:r>
-              <a:rPr lang="en-US" sz="1820" dirty="0" err="1">
-                <a:sym typeface="Wingdings" panose="05000000000000000000" pitchFamily="2" charset="2"/>
-              </a:rPr>
-              <a:t>Buiten</a:t>
-            </a:r>
-            <a:r>
-              <a:rPr lang="en-US" sz="1820" dirty="0">
-                <a:sym typeface="Wingdings" panose="05000000000000000000" pitchFamily="2" charset="2"/>
-              </a:rPr>
-              <a:t> </a:t>
-            </a:r>
-            <a:r>
-              <a:rPr lang="en-US" sz="1820" dirty="0" err="1">
-                <a:sym typeface="Wingdings" panose="05000000000000000000" pitchFamily="2" charset="2"/>
-              </a:rPr>
-              <a:t>safezone</a:t>
-            </a:r>
-            <a:r>
-              <a:rPr lang="en-US" sz="1820" dirty="0">
-                <a:sym typeface="Wingdings" panose="05000000000000000000" pitchFamily="2" charset="2"/>
-              </a:rPr>
-              <a:t>  send alert</a:t>
-            </a:r>
-          </a:p>
-          <a:p>
-            <a:pPr marL="720090" lvl="3" indent="-308610"/>
-            <a:endParaRPr lang="en-US" sz="2000" dirty="0">
-              <a:sym typeface="Wingdings" panose="05000000000000000000" pitchFamily="2" charset="2"/>
-            </a:endParaRPr>
-          </a:p>
-          <a:p>
-            <a:pPr marL="822960" lvl="2" indent="0">
-              <a:buNone/>
-            </a:pPr>
-            <a:endParaRPr lang="en-US" sz="1640" dirty="0">
-              <a:sym typeface="Wingdings" panose="05000000000000000000" pitchFamily="2" charset="2"/>
-            </a:endParaRPr>
-          </a:p>
-          <a:p>
-            <a:pPr marL="411480" lvl="1" indent="0">
-              <a:buNone/>
-            </a:pPr>
-            <a:endParaRPr lang="en-US" sz="1820" dirty="0"/>
+              <a:t> op backend (Ubuntu-server)</a:t>
+            </a:r>
+          </a:p>
+          <a:p>
+            <a:pPr lvl="1"/>
+            <a:endParaRPr lang="en-US" sz="1640" dirty="0"/>
+          </a:p>
+          <a:p>
+            <a:pPr lvl="1"/>
+            <a:endParaRPr lang="en-US" sz="1640" dirty="0"/>
+          </a:p>
+          <a:p>
+            <a:pPr lvl="1"/>
+            <a:endParaRPr lang="en-US" sz="1640" dirty="0"/>
+          </a:p>
+          <a:p>
+            <a:pPr lvl="1"/>
+            <a:endParaRPr lang="en-US" sz="1640" dirty="0"/>
           </a:p>
           <a:p>
             <a:pPr lvl="1"/>
             <a:endParaRPr lang="en-US" sz="1820" dirty="0"/>
+          </a:p>
+          <a:p>
+            <a:pPr lvl="1"/>
+            <a:endParaRPr lang="en-US" sz="1820" dirty="0"/>
+          </a:p>
+          <a:p>
+            <a:pPr lvl="1"/>
+            <a:endParaRPr lang="en-US" sz="1820" dirty="0"/>
+          </a:p>
+          <a:p>
+            <a:pPr lvl="1"/>
+            <a:endParaRPr lang="en-US" sz="1820" dirty="0"/>
+          </a:p>
+          <a:p>
+            <a:endParaRPr lang="en-US" sz="2000" dirty="0"/>
+          </a:p>
+          <a:p>
+            <a:endParaRPr lang="en-US" sz="2000" dirty="0"/>
           </a:p>
         </p:txBody>
       </p:sp>
@@ -15681,7 +16423,7 @@
               <a:rPr lang="en-US" smtClean="0"/>
               <a:t>6</a:t>
             </a:fld>
-            <a:endParaRPr lang="en-US" dirty="0"/>
+            <a:endParaRPr lang="en-US"/>
           </a:p>
         </p:txBody>
       </p:sp>
@@ -15710,7 +16452,7 @@
     </p:spTree>
     <p:extLst>
       <p:ext uri="{BB962C8B-B14F-4D97-AF65-F5344CB8AC3E}">
-        <p14:creationId xmlns:p14="http://schemas.microsoft.com/office/powerpoint/2010/main" val="3378054679"/>
+        <p14:creationId xmlns:p14="http://schemas.microsoft.com/office/powerpoint/2010/main" val="2159170576"/>
       </p:ext>
     </p:extLst>
   </p:cSld>
@@ -15766,7 +16508,7 @@
           <a:p>
             <a:r>
               <a:rPr lang="en-US" dirty="0"/>
-              <a:t>Project: Planning</a:t>
+              <a:t>Planning</a:t>
             </a:r>
           </a:p>
         </p:txBody>
@@ -15788,243 +16530,192 @@
           </a:bodyPr>
           <a:lstStyle/>
           <a:p>
-            <a:pPr marL="102870" indent="0">
-              <a:buNone/>
+            <a:r>
+              <a:rPr lang="en-US" sz="2000" dirty="0" err="1"/>
+              <a:t>eCompass</a:t>
+            </a:r>
+            <a:endParaRPr lang="en-US" sz="2000" dirty="0"/>
+          </a:p>
+          <a:p>
+            <a:pPr lvl="1"/>
+            <a:r>
+              <a:rPr lang="en-US" sz="1820" dirty="0"/>
+              <a:t>Accelerometer (</a:t>
+            </a:r>
+            <a:r>
+              <a:rPr lang="en-US" sz="1820" dirty="0" err="1"/>
+              <a:t>gebruikt</a:t>
+            </a:r>
+            <a:r>
+              <a:rPr lang="en-US" sz="1820" dirty="0"/>
+              <a:t> </a:t>
+            </a:r>
+            <a:r>
+              <a:rPr lang="en-US" sz="1820" dirty="0" err="1"/>
+              <a:t>als</a:t>
+            </a:r>
+            <a:r>
+              <a:rPr lang="en-US" sz="1820" dirty="0"/>
+              <a:t> </a:t>
+            </a:r>
+            <a:r>
+              <a:rPr lang="en-US" sz="1820" dirty="0" err="1"/>
+              <a:t>gyroscoop</a:t>
+            </a:r>
+            <a:r>
+              <a:rPr lang="en-US" sz="1820" dirty="0"/>
+              <a:t>): x/y/z </a:t>
+            </a:r>
+            <a:r>
+              <a:rPr lang="en-US" sz="1820" dirty="0">
+                <a:sym typeface="Wingdings" panose="05000000000000000000" pitchFamily="2" charset="2"/>
+              </a:rPr>
+              <a:t> </a:t>
+            </a:r>
+            <a:r>
+              <a:rPr lang="en-US" sz="1820" dirty="0" err="1">
+                <a:sym typeface="Wingdings" panose="05000000000000000000" pitchFamily="2" charset="2"/>
+              </a:rPr>
+              <a:t>hoeken</a:t>
+            </a:r>
+            <a:endParaRPr lang="en-US" sz="1820" dirty="0">
+              <a:sym typeface="Wingdings" panose="05000000000000000000" pitchFamily="2" charset="2"/>
+            </a:endParaRPr>
+          </a:p>
+          <a:p>
+            <a:pPr lvl="1"/>
+            <a:r>
+              <a:rPr lang="en-US" sz="1820" dirty="0">
+                <a:sym typeface="Wingdings" panose="05000000000000000000" pitchFamily="2" charset="2"/>
+              </a:rPr>
+              <a:t>Magnetometer: x/y/z  </a:t>
+            </a:r>
+            <a:r>
+              <a:rPr lang="en-US" sz="1820" dirty="0" err="1">
+                <a:sym typeface="Wingdings" panose="05000000000000000000" pitchFamily="2" charset="2"/>
+              </a:rPr>
+              <a:t>hoeken</a:t>
+            </a:r>
+            <a:endParaRPr lang="en-US" sz="1820" dirty="0">
+              <a:sym typeface="Wingdings" panose="05000000000000000000" pitchFamily="2" charset="2"/>
+            </a:endParaRPr>
+          </a:p>
+          <a:p>
+            <a:pPr lvl="1"/>
+            <a:r>
+              <a:rPr lang="en-US" sz="1820" dirty="0">
+                <a:sym typeface="Wingdings" panose="05000000000000000000" pitchFamily="2" charset="2"/>
+              </a:rPr>
+              <a:t>Sensor fusion: accelerometer + magnetometer</a:t>
+            </a:r>
+          </a:p>
+          <a:p>
+            <a:pPr lvl="2">
+              <a:buFont typeface="Wingdings" panose="05000000000000000000" pitchFamily="2" charset="2"/>
+              <a:buChar char="à"/>
             </a:pPr>
+            <a:r>
+              <a:rPr lang="en-US" sz="1640" dirty="0">
+                <a:sym typeface="Wingdings" panose="05000000000000000000" pitchFamily="2" charset="2"/>
+              </a:rPr>
+              <a:t>Tilt-compensated compass</a:t>
+            </a:r>
+          </a:p>
+          <a:p>
+            <a:pPr lvl="2">
+              <a:buFont typeface="Wingdings" panose="05000000000000000000" pitchFamily="2" charset="2"/>
+              <a:buChar char="à"/>
+            </a:pPr>
+            <a:endParaRPr lang="en-US" sz="1640" dirty="0">
+              <a:sym typeface="Wingdings" panose="05000000000000000000" pitchFamily="2" charset="2"/>
+            </a:endParaRPr>
+          </a:p>
+          <a:p>
+            <a:pPr marL="308610" lvl="2" indent="-308610"/>
             <a:r>
               <a:rPr lang="en-US" sz="2000" dirty="0">
                 <a:sym typeface="Wingdings" panose="05000000000000000000" pitchFamily="2" charset="2"/>
               </a:rPr>
-              <a:t>De </a:t>
-            </a:r>
-            <a:r>
-              <a:rPr lang="en-US" sz="2000" dirty="0" err="1">
+              <a:t>Backend</a:t>
+            </a:r>
+          </a:p>
+          <a:p>
+            <a:pPr marL="720090" lvl="3" indent="-308610"/>
+            <a:r>
+              <a:rPr lang="en-US" sz="1820" dirty="0">
                 <a:sym typeface="Wingdings" panose="05000000000000000000" pitchFamily="2" charset="2"/>
               </a:rPr>
-              <a:t>volgende</a:t>
-            </a:r>
-            <a:r>
-              <a:rPr lang="en-US" sz="2000" dirty="0">
+              <a:t>Thinghsboard.io: MQTT</a:t>
+            </a:r>
+          </a:p>
+          <a:p>
+            <a:pPr marL="720090" lvl="3" indent="-308610"/>
+            <a:r>
+              <a:rPr lang="en-US" sz="1820" dirty="0">
+                <a:sym typeface="Wingdings" panose="05000000000000000000" pitchFamily="2" charset="2"/>
+              </a:rPr>
+              <a:t>Fingerprinting </a:t>
+            </a:r>
+            <a:r>
+              <a:rPr lang="en-US" sz="1820" dirty="0" err="1">
+                <a:sym typeface="Wingdings" panose="05000000000000000000" pitchFamily="2" charset="2"/>
+              </a:rPr>
+              <a:t>algoritme</a:t>
+            </a:r>
+            <a:r>
+              <a:rPr lang="en-US" sz="1820" dirty="0">
+                <a:sym typeface="Wingdings" panose="05000000000000000000" pitchFamily="2" charset="2"/>
+              </a:rPr>
+              <a:t> op </a:t>
+            </a:r>
+            <a:r>
+              <a:rPr lang="en-US" sz="1820" dirty="0" err="1">
+                <a:sym typeface="Wingdings" panose="05000000000000000000" pitchFamily="2" charset="2"/>
+              </a:rPr>
+              <a:t>draaien</a:t>
+            </a:r>
+            <a:endParaRPr lang="en-US" sz="1820" dirty="0">
+              <a:sym typeface="Wingdings" panose="05000000000000000000" pitchFamily="2" charset="2"/>
+            </a:endParaRPr>
+          </a:p>
+          <a:p>
+            <a:pPr marL="720090" lvl="3" indent="-308610"/>
+            <a:r>
+              <a:rPr lang="en-US" sz="1820" dirty="0" err="1">
+                <a:sym typeface="Wingdings" panose="05000000000000000000" pitchFamily="2" charset="2"/>
+              </a:rPr>
+              <a:t>Buiten</a:t>
+            </a:r>
+            <a:r>
+              <a:rPr lang="en-US" sz="1820" dirty="0">
                 <a:sym typeface="Wingdings" panose="05000000000000000000" pitchFamily="2" charset="2"/>
               </a:rPr>
               <a:t> </a:t>
             </a:r>
             <a:r>
-              <a:rPr lang="en-US" sz="2000" dirty="0" err="1">
+              <a:rPr lang="en-US" sz="1820" dirty="0" err="1">
                 <a:sym typeface="Wingdings" panose="05000000000000000000" pitchFamily="2" charset="2"/>
               </a:rPr>
-              <a:t>weken</a:t>
-            </a:r>
-            <a:r>
-              <a:rPr lang="en-US" sz="2000" dirty="0">
+              <a:t>safezone</a:t>
+            </a:r>
+            <a:r>
+              <a:rPr lang="en-US" sz="1820" dirty="0">
                 <a:sym typeface="Wingdings" panose="05000000000000000000" pitchFamily="2" charset="2"/>
               </a:rPr>
-              <a:t> </a:t>
-            </a:r>
-            <a:r>
-              <a:rPr lang="en-US" sz="2000" dirty="0" err="1">
-                <a:sym typeface="Wingdings" panose="05000000000000000000" pitchFamily="2" charset="2"/>
-              </a:rPr>
-              <a:t>houden</a:t>
-            </a:r>
-            <a:r>
-              <a:rPr lang="en-US" sz="2000" dirty="0">
-                <a:sym typeface="Wingdings" panose="05000000000000000000" pitchFamily="2" charset="2"/>
-              </a:rPr>
-              <a:t> we </a:t>
-            </a:r>
-            <a:r>
-              <a:rPr lang="en-US" sz="2000" dirty="0" err="1">
-                <a:sym typeface="Wingdings" panose="05000000000000000000" pitchFamily="2" charset="2"/>
-              </a:rPr>
-              <a:t>ons</a:t>
-            </a:r>
-            <a:r>
-              <a:rPr lang="en-US" sz="2000" dirty="0">
-                <a:sym typeface="Wingdings" panose="05000000000000000000" pitchFamily="2" charset="2"/>
-              </a:rPr>
-              <a:t> </a:t>
-            </a:r>
-            <a:r>
-              <a:rPr lang="en-US" sz="2000" dirty="0" err="1">
-                <a:sym typeface="Wingdings" panose="05000000000000000000" pitchFamily="2" charset="2"/>
-              </a:rPr>
-              <a:t>bezig</a:t>
-            </a:r>
-            <a:r>
-              <a:rPr lang="en-US" sz="2000" dirty="0">
-                <a:sym typeface="Wingdings" panose="05000000000000000000" pitchFamily="2" charset="2"/>
-              </a:rPr>
-              <a:t> met </a:t>
-            </a:r>
-            <a:r>
-              <a:rPr lang="en-US" sz="2000" dirty="0" err="1">
-                <a:sym typeface="Wingdings" panose="05000000000000000000" pitchFamily="2" charset="2"/>
-              </a:rPr>
-              <a:t>volgende</a:t>
-            </a:r>
-            <a:r>
-              <a:rPr lang="en-US" sz="2000" dirty="0">
-                <a:sym typeface="Wingdings" panose="05000000000000000000" pitchFamily="2" charset="2"/>
-              </a:rPr>
-              <a:t> </a:t>
-            </a:r>
-            <a:r>
-              <a:rPr lang="en-US" sz="2000" dirty="0" err="1">
-                <a:sym typeface="Wingdings" panose="05000000000000000000" pitchFamily="2" charset="2"/>
-              </a:rPr>
-              <a:t>onderwerpen</a:t>
-            </a:r>
-            <a:r>
-              <a:rPr lang="en-US" sz="2000" dirty="0">
-                <a:sym typeface="Wingdings" panose="05000000000000000000" pitchFamily="2" charset="2"/>
-              </a:rPr>
-              <a:t> per 2:</a:t>
-            </a:r>
-          </a:p>
-          <a:p>
-            <a:pPr marL="445770" indent="-342900">
-              <a:buFont typeface="+mj-lt"/>
-              <a:buAutoNum type="arabicPeriod"/>
-            </a:pPr>
-            <a:r>
-              <a:rPr lang="en-US" sz="2000" dirty="0">
-                <a:sym typeface="Wingdings" panose="05000000000000000000" pitchFamily="2" charset="2"/>
-              </a:rPr>
-              <a:t>GPS module (Jonas &amp; </a:t>
-            </a:r>
-            <a:r>
-              <a:rPr lang="en-US" sz="2000" dirty="0" err="1">
-                <a:sym typeface="Wingdings" panose="05000000000000000000" pitchFamily="2" charset="2"/>
-              </a:rPr>
-              <a:t>Lennert</a:t>
-            </a:r>
-            <a:r>
-              <a:rPr lang="en-US" sz="2000" dirty="0">
-                <a:sym typeface="Wingdings" panose="05000000000000000000" pitchFamily="2" charset="2"/>
-              </a:rPr>
-              <a:t>) + fingerprinting (Liam &amp; Thomas)</a:t>
-            </a:r>
-          </a:p>
-          <a:p>
-            <a:pPr marL="445770" indent="-342900">
-              <a:buFont typeface="+mj-lt"/>
-              <a:buAutoNum type="arabicPeriod"/>
-            </a:pPr>
-            <a:r>
-              <a:rPr lang="en-US" sz="2000" dirty="0">
-                <a:sym typeface="Wingdings" panose="05000000000000000000" pitchFamily="2" charset="2"/>
-              </a:rPr>
-              <a:t>Backend (</a:t>
-            </a:r>
-            <a:r>
-              <a:rPr lang="en-US" sz="2000" dirty="0" err="1">
-                <a:sym typeface="Wingdings" panose="05000000000000000000" pitchFamily="2" charset="2"/>
-              </a:rPr>
-              <a:t>Lennert</a:t>
-            </a:r>
-            <a:r>
-              <a:rPr lang="en-US" sz="2000" dirty="0">
-                <a:sym typeface="Wingdings" panose="05000000000000000000" pitchFamily="2" charset="2"/>
-              </a:rPr>
-              <a:t> &amp; Thomas) + </a:t>
-            </a:r>
-            <a:r>
-              <a:rPr lang="en-US" sz="2000" dirty="0" err="1">
-                <a:sym typeface="Wingdings" panose="05000000000000000000" pitchFamily="2" charset="2"/>
-              </a:rPr>
-              <a:t>eCompass</a:t>
-            </a:r>
-            <a:r>
-              <a:rPr lang="en-US" sz="2000" dirty="0">
-                <a:sym typeface="Wingdings" panose="05000000000000000000" pitchFamily="2" charset="2"/>
-              </a:rPr>
-              <a:t> (Jonas &amp; Liam)</a:t>
-            </a:r>
-          </a:p>
-          <a:p>
-            <a:pPr marL="445770" indent="-342900">
-              <a:buFont typeface="+mj-lt"/>
-              <a:buAutoNum type="arabicPeriod"/>
-            </a:pPr>
-            <a:r>
-              <a:rPr lang="en-US" sz="2000" dirty="0" err="1">
-                <a:sym typeface="Wingdings" panose="05000000000000000000" pitchFamily="2" charset="2"/>
-              </a:rPr>
-              <a:t>Communicatie</a:t>
-            </a:r>
-            <a:r>
-              <a:rPr lang="en-US" sz="2000" dirty="0">
-                <a:sym typeface="Wingdings" panose="05000000000000000000" pitchFamily="2" charset="2"/>
-              </a:rPr>
-              <a:t> (</a:t>
-            </a:r>
-            <a:r>
-              <a:rPr lang="en-US" sz="2000" dirty="0" err="1">
-                <a:sym typeface="Wingdings" panose="05000000000000000000" pitchFamily="2" charset="2"/>
-              </a:rPr>
-              <a:t>LoRaWAN</a:t>
-            </a:r>
-            <a:r>
-              <a:rPr lang="en-US" sz="2000" dirty="0">
-                <a:sym typeface="Wingdings" panose="05000000000000000000" pitchFamily="2" charset="2"/>
-              </a:rPr>
-              <a:t> + DASH7) (Liam, Jonas &amp; Thomas)</a:t>
-            </a:r>
-            <a:br>
-              <a:rPr lang="en-US" sz="2000" dirty="0">
-                <a:sym typeface="Wingdings" panose="05000000000000000000" pitchFamily="2" charset="2"/>
-              </a:rPr>
-            </a:br>
-            <a:r>
-              <a:rPr lang="en-US" sz="2000" dirty="0">
-                <a:sym typeface="Wingdings" panose="05000000000000000000" pitchFamily="2" charset="2"/>
-              </a:rPr>
-              <a:t>Fall detection (</a:t>
-            </a:r>
-            <a:r>
-              <a:rPr lang="en-US" sz="2000" dirty="0" err="1">
-                <a:sym typeface="Wingdings" panose="05000000000000000000" pitchFamily="2" charset="2"/>
-              </a:rPr>
-              <a:t>Lennert</a:t>
-            </a:r>
-            <a:r>
-              <a:rPr lang="en-US" sz="2000" dirty="0">
-                <a:sym typeface="Wingdings" panose="05000000000000000000" pitchFamily="2" charset="2"/>
-              </a:rPr>
-              <a:t>)</a:t>
-            </a:r>
-          </a:p>
-          <a:p>
-            <a:pPr marL="445770" indent="-342900">
-              <a:buFont typeface="+mj-lt"/>
-              <a:buAutoNum type="arabicPeriod"/>
-            </a:pPr>
-            <a:r>
-              <a:rPr lang="en-US" sz="2000">
-                <a:sym typeface="Wingdings" panose="05000000000000000000" pitchFamily="2" charset="2"/>
-              </a:rPr>
-              <a:t>Uitbreidingen</a:t>
-            </a:r>
+              <a:t>  send alert</a:t>
+            </a:r>
+          </a:p>
+          <a:p>
+            <a:pPr marL="720090" lvl="3" indent="-308610"/>
             <a:endParaRPr lang="en-US" sz="2000" dirty="0">
               <a:sym typeface="Wingdings" panose="05000000000000000000" pitchFamily="2" charset="2"/>
             </a:endParaRPr>
           </a:p>
           <a:p>
-            <a:pPr marL="445770" indent="-342900">
-              <a:buFont typeface="+mj-lt"/>
-              <a:buAutoNum type="arabicPeriod"/>
+            <a:pPr marL="822960" lvl="2" indent="0">
+              <a:buNone/>
             </a:pPr>
-            <a:endParaRPr lang="en-US" sz="2000" dirty="0">
-              <a:sym typeface="Wingdings" panose="05000000000000000000" pitchFamily="2" charset="2"/>
-            </a:endParaRPr>
-          </a:p>
-          <a:p>
-            <a:pPr marL="445770" indent="-342900">
-              <a:buFont typeface="+mj-lt"/>
-              <a:buAutoNum type="arabicPeriod"/>
-            </a:pPr>
-            <a:endParaRPr lang="en-US" sz="2000" dirty="0">
+            <a:endParaRPr lang="en-US" sz="1640" dirty="0">
               <a:sym typeface="Wingdings" panose="05000000000000000000" pitchFamily="2" charset="2"/>
             </a:endParaRPr>
           </a:p>
@@ -16063,10 +16754,32 @@
           </a:p>
         </p:txBody>
       </p:sp>
+      <p:sp>
+        <p:nvSpPr>
+          <p:cNvPr id="4" name="Text Placeholder 3"/>
+          <p:cNvSpPr>
+            <a:spLocks noGrp="1"/>
+          </p:cNvSpPr>
+          <p:nvPr>
+            <p:ph type="body" sz="quarter" idx="13"/>
+          </p:nvPr>
+        </p:nvSpPr>
+        <p:spPr/>
+        <p:txBody>
+          <a:bodyPr/>
+          <a:lstStyle/>
+          <a:p>
+            <a:r>
+              <a:rPr lang="en-US" dirty="0"/>
+              <a:t>In detail</a:t>
+            </a:r>
+          </a:p>
+        </p:txBody>
+      </p:sp>
     </p:spTree>
     <p:extLst>
       <p:ext uri="{BB962C8B-B14F-4D97-AF65-F5344CB8AC3E}">
-        <p14:creationId xmlns:p14="http://schemas.microsoft.com/office/powerpoint/2010/main" val="55613853"/>
+        <p14:creationId xmlns:p14="http://schemas.microsoft.com/office/powerpoint/2010/main" val="3378054679"/>
       </p:ext>
     </p:extLst>
   </p:cSld>
@@ -16122,15 +16835,7 @@
           <a:p>
             <a:r>
               <a:rPr lang="en-US" dirty="0"/>
-              <a:t>Project: </a:t>
-            </a:r>
-            <a:r>
-              <a:rPr lang="en-US" dirty="0" err="1"/>
-              <a:t>Uitgevoerde</a:t>
-            </a:r>
-            <a:r>
-              <a:rPr lang="en-US" dirty="0"/>
-              <a:t> planning</a:t>
+              <a:t>Planning</a:t>
             </a:r>
           </a:p>
         </p:txBody>
@@ -16156,16 +16861,22 @@
               <a:buNone/>
             </a:pPr>
             <a:r>
+              <a:rPr lang="en-US" sz="2000" dirty="0" err="1">
+                <a:sym typeface="Wingdings" panose="05000000000000000000" pitchFamily="2" charset="2"/>
+              </a:rPr>
+              <a:t>Taakverdeling</a:t>
+            </a:r>
+            <a:r>
               <a:rPr lang="en-US" sz="2000" dirty="0">
                 <a:sym typeface="Wingdings" panose="05000000000000000000" pitchFamily="2" charset="2"/>
               </a:rPr>
-              <a:t>Week van 22/11:</a:t>
+              <a:t>:</a:t>
             </a:r>
           </a:p>
           <a:p>
             <a:pPr marL="445770" indent="-342900">
-              <a:buFont typeface="Arial" panose="020B0604020202020204" pitchFamily="34" charset="0"/>
-              <a:buChar char="•"/>
+              <a:buFont typeface="+mj-lt"/>
+              <a:buAutoNum type="arabicPeriod"/>
             </a:pPr>
             <a:r>
               <a:rPr lang="en-US" sz="2000" dirty="0">
@@ -16183,50 +16894,109 @@
               <a:rPr lang="en-US" sz="2000" dirty="0">
                 <a:sym typeface="Wingdings" panose="05000000000000000000" pitchFamily="2" charset="2"/>
               </a:rPr>
-              <a:t>)</a:t>
+              <a:t>) + fingerprinting (Liam &amp; Thomas)</a:t>
             </a:r>
           </a:p>
           <a:p>
             <a:pPr marL="445770" indent="-342900">
-              <a:buFont typeface="Arial" panose="020B0604020202020204" pitchFamily="34" charset="0"/>
-              <a:buChar char="•"/>
+              <a:buFont typeface="+mj-lt"/>
+              <a:buAutoNum type="arabicPeriod"/>
             </a:pPr>
             <a:r>
               <a:rPr lang="en-US" sz="2000" dirty="0">
                 <a:sym typeface="Wingdings" panose="05000000000000000000" pitchFamily="2" charset="2"/>
               </a:rPr>
-              <a:t>Fingerprinting database </a:t>
+              <a:t>Backend (</a:t>
             </a:r>
             <a:r>
               <a:rPr lang="en-US" sz="2000" dirty="0" err="1">
                 <a:sym typeface="Wingdings" panose="05000000000000000000" pitchFamily="2" charset="2"/>
               </a:rPr>
-              <a:t>gemaakt</a:t>
+              <a:t>Lennert</a:t>
             </a:r>
             <a:r>
               <a:rPr lang="en-US" sz="2000" dirty="0">
                 <a:sym typeface="Wingdings" panose="05000000000000000000" pitchFamily="2" charset="2"/>
               </a:rPr>
-              <a:t> + Python script </a:t>
+              <a:t> &amp; Thomas) + </a:t>
             </a:r>
             <a:r>
               <a:rPr lang="en-US" sz="2000" dirty="0" err="1">
                 <a:sym typeface="Wingdings" panose="05000000000000000000" pitchFamily="2" charset="2"/>
               </a:rPr>
-              <a:t>lokalisatie</a:t>
+              <a:t>eCompass</a:t>
             </a:r>
             <a:r>
               <a:rPr lang="en-US" sz="2000" dirty="0">
                 <a:sym typeface="Wingdings" panose="05000000000000000000" pitchFamily="2" charset="2"/>
               </a:rPr>
-              <a:t> (Liam &amp; Thomas)</a:t>
+              <a:t> (Jonas &amp; Liam)</a:t>
             </a:r>
           </a:p>
           <a:p>
             <a:pPr marL="445770" indent="-342900">
-              <a:buFont typeface="Arial" panose="020B0604020202020204" pitchFamily="34" charset="0"/>
-              <a:buChar char="•"/>
+              <a:buFont typeface="+mj-lt"/>
+              <a:buAutoNum type="arabicPeriod"/>
             </a:pPr>
+            <a:r>
+              <a:rPr lang="en-US" sz="2000" dirty="0" err="1">
+                <a:sym typeface="Wingdings" panose="05000000000000000000" pitchFamily="2" charset="2"/>
+              </a:rPr>
+              <a:t>Communicatie</a:t>
+            </a:r>
+            <a:r>
+              <a:rPr lang="en-US" sz="2000" dirty="0">
+                <a:sym typeface="Wingdings" panose="05000000000000000000" pitchFamily="2" charset="2"/>
+              </a:rPr>
+              <a:t> (</a:t>
+            </a:r>
+            <a:r>
+              <a:rPr lang="en-US" sz="2000" dirty="0" err="1">
+                <a:sym typeface="Wingdings" panose="05000000000000000000" pitchFamily="2" charset="2"/>
+              </a:rPr>
+              <a:t>LoRaWAN</a:t>
+            </a:r>
+            <a:r>
+              <a:rPr lang="en-US" sz="2000" dirty="0">
+                <a:sym typeface="Wingdings" panose="05000000000000000000" pitchFamily="2" charset="2"/>
+              </a:rPr>
+              <a:t> + DASH7) (Liam, Jonas &amp; Thomas)</a:t>
+            </a:r>
+            <a:br>
+              <a:rPr lang="en-US" sz="2000" dirty="0">
+                <a:sym typeface="Wingdings" panose="05000000000000000000" pitchFamily="2" charset="2"/>
+              </a:rPr>
+            </a:br>
+            <a:r>
+              <a:rPr lang="en-US" sz="2000" dirty="0">
+                <a:sym typeface="Wingdings" panose="05000000000000000000" pitchFamily="2" charset="2"/>
+              </a:rPr>
+              <a:t>Fall detection (</a:t>
+            </a:r>
+            <a:r>
+              <a:rPr lang="en-US" sz="2000" dirty="0" err="1">
+                <a:sym typeface="Wingdings" panose="05000000000000000000" pitchFamily="2" charset="2"/>
+              </a:rPr>
+              <a:t>Lennert</a:t>
+            </a:r>
+            <a:r>
+              <a:rPr lang="en-US" sz="2000" dirty="0">
+                <a:sym typeface="Wingdings" panose="05000000000000000000" pitchFamily="2" charset="2"/>
+              </a:rPr>
+              <a:t>)</a:t>
+            </a:r>
+          </a:p>
+          <a:p>
+            <a:pPr marL="445770" indent="-342900">
+              <a:buFont typeface="+mj-lt"/>
+              <a:buAutoNum type="arabicPeriod"/>
+            </a:pPr>
+            <a:r>
+              <a:rPr lang="en-US" sz="2000" dirty="0" err="1">
+                <a:sym typeface="Wingdings" panose="05000000000000000000" pitchFamily="2" charset="2"/>
+              </a:rPr>
+              <a:t>Uitbreidingen</a:t>
+            </a:r>
             <a:endParaRPr lang="en-US" sz="2000" dirty="0">
               <a:sym typeface="Wingdings" panose="05000000000000000000" pitchFamily="2" charset="2"/>
             </a:endParaRPr>
@@ -16250,24 +17020,6 @@
             </a:endParaRPr>
           </a:p>
           <a:p>
-            <a:pPr marL="445770" indent="-342900">
-              <a:buFont typeface="+mj-lt"/>
-              <a:buAutoNum type="arabicPeriod"/>
-            </a:pPr>
-            <a:endParaRPr lang="en-US" sz="2000" dirty="0">
-              <a:sym typeface="Wingdings" panose="05000000000000000000" pitchFamily="2" charset="2"/>
-            </a:endParaRPr>
-          </a:p>
-          <a:p>
-            <a:pPr marL="445770" indent="-342900">
-              <a:buFont typeface="+mj-lt"/>
-              <a:buAutoNum type="arabicPeriod"/>
-            </a:pPr>
-            <a:endParaRPr lang="en-US" sz="2000" dirty="0">
-              <a:sym typeface="Wingdings" panose="05000000000000000000" pitchFamily="2" charset="2"/>
-            </a:endParaRPr>
-          </a:p>
-          <a:p>
             <a:pPr marL="411480" lvl="1" indent="0">
               <a:buNone/>
             </a:pPr>
@@ -16305,7 +17057,7 @@
     </p:spTree>
     <p:extLst>
       <p:ext uri="{BB962C8B-B14F-4D97-AF65-F5344CB8AC3E}">
-        <p14:creationId xmlns:p14="http://schemas.microsoft.com/office/powerpoint/2010/main" val="3108488533"/>
+        <p14:creationId xmlns:p14="http://schemas.microsoft.com/office/powerpoint/2010/main" val="55613853"/>
       </p:ext>
     </p:extLst>
   </p:cSld>
@@ -16398,7 +17150,7 @@
               <a:rPr lang="en-US" sz="2000" dirty="0">
                 <a:sym typeface="Wingdings" panose="05000000000000000000" pitchFamily="2" charset="2"/>
               </a:rPr>
-              <a:t>Week van 29/11:</a:t>
+              <a:t>Week van 22/11:</a:t>
             </a:r>
           </a:p>
           <a:p>
@@ -16410,7 +17162,19 @@
               <a:rPr lang="en-US" sz="2000" dirty="0">
                 <a:sym typeface="Wingdings" panose="05000000000000000000" pitchFamily="2" charset="2"/>
               </a:rPr>
-              <a:t>GPS (Jonas)</a:t>
+              <a:t>GPS module (Jonas &amp; </a:t>
+            </a:r>
+            <a:r>
+              <a:rPr lang="en-US" sz="2000" dirty="0" err="1">
+                <a:sym typeface="Wingdings" panose="05000000000000000000" pitchFamily="2" charset="2"/>
+              </a:rPr>
+              <a:t>Lennert</a:t>
+            </a:r>
+            <a:r>
+              <a:rPr lang="en-US" sz="2000" dirty="0">
+                <a:sym typeface="Wingdings" panose="05000000000000000000" pitchFamily="2" charset="2"/>
+              </a:rPr>
+              <a:t>)</a:t>
             </a:r>
           </a:p>
           <a:p>
@@ -16422,49 +17186,31 @@
               <a:rPr lang="en-US" sz="2000" dirty="0">
                 <a:sym typeface="Wingdings" panose="05000000000000000000" pitchFamily="2" charset="2"/>
               </a:rPr>
-              <a:t>Backend </a:t>
+              <a:t>Fingerprinting database </a:t>
             </a:r>
             <a:r>
               <a:rPr lang="en-US" sz="2000" dirty="0" err="1">
                 <a:sym typeface="Wingdings" panose="05000000000000000000" pitchFamily="2" charset="2"/>
               </a:rPr>
-              <a:t>klaar</a:t>
+              <a:t>gemaakt</a:t>
             </a:r>
             <a:r>
               <a:rPr lang="en-US" sz="2000" dirty="0">
                 <a:sym typeface="Wingdings" panose="05000000000000000000" pitchFamily="2" charset="2"/>
               </a:rPr>
-              <a:t> (Thomas &amp; Liam)</a:t>
-            </a:r>
-          </a:p>
-          <a:p>
-            <a:pPr marL="445770" indent="-342900">
-              <a:buFont typeface="Arial" panose="020B0604020202020204" pitchFamily="34" charset="0"/>
-              <a:buChar char="•"/>
-            </a:pPr>
+              <a:t> + Python script </a:t>
+            </a:r>
             <a:r>
               <a:rPr lang="en-US" sz="2000" dirty="0" err="1">
                 <a:sym typeface="Wingdings" panose="05000000000000000000" pitchFamily="2" charset="2"/>
               </a:rPr>
-              <a:t>LoRaWAN</a:t>
+              <a:t>lokalisatie</a:t>
             </a:r>
             <a:r>
               <a:rPr lang="en-US" sz="2000" dirty="0">
                 <a:sym typeface="Wingdings" panose="05000000000000000000" pitchFamily="2" charset="2"/>
               </a:rPr>
-              <a:t> (</a:t>
-            </a:r>
-            <a:r>
-              <a:rPr lang="en-US" sz="2000" dirty="0" err="1">
-                <a:sym typeface="Wingdings" panose="05000000000000000000" pitchFamily="2" charset="2"/>
-              </a:rPr>
-              <a:t>Lennert</a:t>
-            </a:r>
-            <a:r>
-              <a:rPr lang="en-US" sz="2000" dirty="0">
-                <a:sym typeface="Wingdings" panose="05000000000000000000" pitchFamily="2" charset="2"/>
-              </a:rPr>
-              <a:t>)</a:t>
+              <a:t> (Liam &amp; Thomas)</a:t>
             </a:r>
           </a:p>
           <a:p>
@@ -16550,7 +17296,7 @@
     </p:spTree>
     <p:extLst>
       <p:ext uri="{BB962C8B-B14F-4D97-AF65-F5344CB8AC3E}">
-        <p14:creationId xmlns:p14="http://schemas.microsoft.com/office/powerpoint/2010/main" val="3343426595"/>
+        <p14:creationId xmlns:p14="http://schemas.microsoft.com/office/powerpoint/2010/main" val="3108488533"/>
       </p:ext>
     </p:extLst>
   </p:cSld>

</xml_diff>